<commit_message>
Teme za CSS predavanja Prezentacija za prvo predavanje iz CSS-a
</commit_message>
<xml_diff>
--- a/sesija-20/PPT/Front-End Developer-20.pptx
+++ b/sesija-20/PPT/Front-End Developer-20.pptx
@@ -6,13 +6,27 @@
     <p:sldMasterId id="2147483676" r:id="rId2"/>
   </p:sldMasterIdLst>
   <p:notesMasterIdLst>
-    <p:notesMasterId r:id="rId7"/>
+    <p:notesMasterId r:id="rId21"/>
   </p:notesMasterIdLst>
   <p:sldIdLst>
     <p:sldId id="256" r:id="rId3"/>
     <p:sldId id="257" r:id="rId4"/>
     <p:sldId id="258" r:id="rId5"/>
     <p:sldId id="263" r:id="rId6"/>
+    <p:sldId id="264" r:id="rId7"/>
+    <p:sldId id="265" r:id="rId8"/>
+    <p:sldId id="266" r:id="rId9"/>
+    <p:sldId id="267" r:id="rId10"/>
+    <p:sldId id="268" r:id="rId11"/>
+    <p:sldId id="277" r:id="rId12"/>
+    <p:sldId id="269" r:id="rId13"/>
+    <p:sldId id="270" r:id="rId14"/>
+    <p:sldId id="271" r:id="rId15"/>
+    <p:sldId id="272" r:id="rId16"/>
+    <p:sldId id="273" r:id="rId17"/>
+    <p:sldId id="276" r:id="rId18"/>
+    <p:sldId id="274" r:id="rId19"/>
+    <p:sldId id="275" r:id="rId20"/>
   </p:sldIdLst>
   <p:sldSz cx="12192000" cy="6858000"/>
   <p:notesSz cx="6858000" cy="9144000"/>
@@ -120,6 +134,20 @@
             <p14:sldId id="257"/>
             <p14:sldId id="258"/>
             <p14:sldId id="263"/>
+            <p14:sldId id="264"/>
+            <p14:sldId id="265"/>
+            <p14:sldId id="266"/>
+            <p14:sldId id="267"/>
+            <p14:sldId id="268"/>
+            <p14:sldId id="277"/>
+            <p14:sldId id="269"/>
+            <p14:sldId id="270"/>
+            <p14:sldId id="271"/>
+            <p14:sldId id="272"/>
+            <p14:sldId id="273"/>
+            <p14:sldId id="276"/>
+            <p14:sldId id="274"/>
+            <p14:sldId id="275"/>
           </p14:sldIdLst>
         </p14:section>
       </p14:sectionLst>
@@ -903,10 +931,10 @@
         <a:lstStyle/>
         <a:p>
           <a:r>
-            <a:rPr lang="en-US" b="1" smtClean="0"/>
-            <a:t>HTML</a:t>
+            <a:rPr lang="en-US" b="1" dirty="0" smtClean="0"/>
+            <a:t>CSS</a:t>
           </a:r>
-          <a:endParaRPr lang="en-US"/>
+          <a:endParaRPr lang="en-US" dirty="0"/>
         </a:p>
       </dgm:t>
     </dgm:pt>
@@ -931,25 +959,6 @@
           <a:endParaRPr lang="en-US"/>
         </a:p>
       </dgm:t>
-    </dgm:pt>
-    <dgm:pt modelId="{7BA3726F-3900-4FC3-8B1E-5B513F942281}">
-      <dgm:prSet phldrT="[Text]"/>
-      <dgm:spPr/>
-      <dgm:t>
-        <a:bodyPr/>
-        <a:lstStyle/>
-        <a:p>
-          <a:endParaRPr lang="en-US"/>
-        </a:p>
-      </dgm:t>
-    </dgm:pt>
-    <dgm:pt modelId="{F89418B0-7D47-48D3-A0DD-7DC00E292A1E}" type="parTrans" cxnId="{C78D7D1E-4353-489A-8F01-856C716DDAA5}">
-      <dgm:prSet/>
-      <dgm:spPr/>
-    </dgm:pt>
-    <dgm:pt modelId="{B8A6BCFB-F597-4971-BF20-6B7B52347AE9}" type="sibTrans" cxnId="{C78D7D1E-4353-489A-8F01-856C716DDAA5}">
-      <dgm:prSet/>
-      <dgm:spPr/>
     </dgm:pt>
     <dgm:pt modelId="{AEABCDDF-3180-4C76-A7CB-FC0B6AF0719A}" type="pres">
       <dgm:prSet presAssocID="{4EE1351B-4B79-4D48-8F5E-455F7AD945A8}" presName="linear" presStyleCnt="0">
@@ -983,30 +992,12 @@
         </a:p>
       </dgm:t>
     </dgm:pt>
-    <dgm:pt modelId="{AADBD8E6-695F-4FE3-9A02-D807BC812A7C}" type="pres">
-      <dgm:prSet presAssocID="{01EB205F-FC18-44EF-B4D7-07083A382D6D}" presName="childText" presStyleLbl="revTx" presStyleIdx="0" presStyleCnt="1">
-        <dgm:presLayoutVars>
-          <dgm:bulletEnabled val="1"/>
-        </dgm:presLayoutVars>
-      </dgm:prSet>
-      <dgm:spPr/>
-      <dgm:t>
-        <a:bodyPr/>
-        <a:lstStyle/>
-        <a:p>
-          <a:endParaRPr lang="en-US"/>
-        </a:p>
-      </dgm:t>
-    </dgm:pt>
   </dgm:ptLst>
   <dgm:cxnLst>
-    <dgm:cxn modelId="{C5A8E9B4-A897-4242-BCB6-414B02FAC18D}" type="presOf" srcId="{7BA3726F-3900-4FC3-8B1E-5B513F942281}" destId="{AADBD8E6-695F-4FE3-9A02-D807BC812A7C}" srcOrd="0" destOrd="0" presId="urn:microsoft.com/office/officeart/2005/8/layout/vList2"/>
     <dgm:cxn modelId="{FB3F133B-D980-4586-8A93-14087C2AFDB7}" type="presOf" srcId="{01EB205F-FC18-44EF-B4D7-07083A382D6D}" destId="{F4D94EE2-DE87-41D3-8995-9FDA4ED2D4BE}" srcOrd="0" destOrd="0" presId="urn:microsoft.com/office/officeart/2005/8/layout/vList2"/>
-    <dgm:cxn modelId="{C78D7D1E-4353-489A-8F01-856C716DDAA5}" srcId="{01EB205F-FC18-44EF-B4D7-07083A382D6D}" destId="{7BA3726F-3900-4FC3-8B1E-5B513F942281}" srcOrd="0" destOrd="0" parTransId="{F89418B0-7D47-48D3-A0DD-7DC00E292A1E}" sibTransId="{B8A6BCFB-F597-4971-BF20-6B7B52347AE9}"/>
     <dgm:cxn modelId="{554D4833-0D13-4D4C-92BF-76D83AECFDE6}" srcId="{4EE1351B-4B79-4D48-8F5E-455F7AD945A8}" destId="{01EB205F-FC18-44EF-B4D7-07083A382D6D}" srcOrd="0" destOrd="0" parTransId="{D4C6F2B3-566C-488E-AC05-F7BDFB6B7331}" sibTransId="{2BF717F9-FCD3-4CE3-A0A5-83D104AFB328}"/>
     <dgm:cxn modelId="{9ADF0326-01FB-4790-B759-ACDFB0217796}" type="presOf" srcId="{4EE1351B-4B79-4D48-8F5E-455F7AD945A8}" destId="{AEABCDDF-3180-4C76-A7CB-FC0B6AF0719A}" srcOrd="0" destOrd="0" presId="urn:microsoft.com/office/officeart/2005/8/layout/vList2"/>
     <dgm:cxn modelId="{541BD5B9-51DA-497F-838D-CDA31366E980}" type="presParOf" srcId="{AEABCDDF-3180-4C76-A7CB-FC0B6AF0719A}" destId="{F4D94EE2-DE87-41D3-8995-9FDA4ED2D4BE}" srcOrd="0" destOrd="0" presId="urn:microsoft.com/office/officeart/2005/8/layout/vList2"/>
-    <dgm:cxn modelId="{C7801D2E-7067-4E56-86BD-8C707C34363A}" type="presParOf" srcId="{AEABCDDF-3180-4C76-A7CB-FC0B6AF0719A}" destId="{AADBD8E6-695F-4FE3-9A02-D807BC812A7C}" srcOrd="1" destOrd="0" presId="urn:microsoft.com/office/officeart/2005/8/layout/vList2"/>
   </dgm:cxnLst>
   <dgm:bg/>
   <dgm:whole/>
@@ -1033,7 +1024,7 @@
       </dsp:nvSpPr>
       <dsp:spPr>
         <a:xfrm>
-          <a:off x="0" y="1548347"/>
+          <a:off x="0" y="2086548"/>
           <a:ext cx="8298873" cy="1521000"/>
         </a:xfrm>
         <a:prstGeom prst="roundRect">
@@ -1092,72 +1083,15 @@
             </a:spcAft>
           </a:pPr>
           <a:r>
-            <a:rPr lang="en-US" sz="6500" b="1" kern="1200" smtClean="0"/>
-            <a:t>HTML</a:t>
+            <a:rPr lang="en-US" sz="6500" b="1" kern="1200" dirty="0" smtClean="0"/>
+            <a:t>CSS</a:t>
           </a:r>
-          <a:endParaRPr lang="en-US" sz="6500" kern="1200"/>
+          <a:endParaRPr lang="en-US" sz="6500" kern="1200" dirty="0"/>
         </a:p>
       </dsp:txBody>
       <dsp:txXfrm>
-        <a:off x="74249" y="1622596"/>
+        <a:off x="74249" y="2160797"/>
         <a:ext cx="8150375" cy="1372502"/>
-      </dsp:txXfrm>
-    </dsp:sp>
-    <dsp:sp modelId="{AADBD8E6-695F-4FE3-9A02-D807BC812A7C}">
-      <dsp:nvSpPr>
-        <dsp:cNvPr id="0" name=""/>
-        <dsp:cNvSpPr/>
-      </dsp:nvSpPr>
-      <dsp:spPr>
-        <a:xfrm>
-          <a:off x="0" y="3069347"/>
-          <a:ext cx="8298873" cy="1076400"/>
-        </a:xfrm>
-        <a:prstGeom prst="rect">
-          <a:avLst/>
-        </a:prstGeom>
-        <a:noFill/>
-        <a:ln>
-          <a:noFill/>
-        </a:ln>
-        <a:effectLst/>
-      </dsp:spPr>
-      <dsp:style>
-        <a:lnRef idx="0">
-          <a:scrgbClr r="0" g="0" b="0"/>
-        </a:lnRef>
-        <a:fillRef idx="0">
-          <a:scrgbClr r="0" g="0" b="0"/>
-        </a:fillRef>
-        <a:effectRef idx="0">
-          <a:scrgbClr r="0" g="0" b="0"/>
-        </a:effectRef>
-        <a:fontRef idx="minor"/>
-      </dsp:style>
-      <dsp:txBody>
-        <a:bodyPr spcFirstLastPara="0" vert="horz" wrap="square" lIns="263489" tIns="82550" rIns="462280" bIns="82550" numCol="1" spcCol="1270" anchor="t" anchorCtr="0">
-          <a:noAutofit/>
-        </a:bodyPr>
-        <a:lstStyle/>
-        <a:p>
-          <a:pPr marL="285750" lvl="1" indent="-285750" algn="l" defTabSz="2266950">
-            <a:lnSpc>
-              <a:spcPct val="90000"/>
-            </a:lnSpc>
-            <a:spcBef>
-              <a:spcPct val="0"/>
-            </a:spcBef>
-            <a:spcAft>
-              <a:spcPct val="20000"/>
-            </a:spcAft>
-            <a:buChar char="••"/>
-          </a:pPr>
-          <a:endParaRPr lang="en-US" sz="5100" kern="1200"/>
-        </a:p>
-      </dsp:txBody>
-      <dsp:txXfrm>
-        <a:off x="0" y="3069347"/>
-        <a:ext cx="8298873" cy="1076400"/>
       </dsp:txXfrm>
     </dsp:sp>
   </dsp:spTree>
@@ -2447,7 +2381,7 @@
           <a:p>
             <a:fld id="{D32AC403-8EB1-4D4E-8C3A-24BD19820531}" type="datetimeFigureOut">
               <a:rPr lang="en-US" smtClean="0"/>
-              <a:t>13-Mar-18</a:t>
+              <a:t>3/20/2018</a:t>
             </a:fld>
             <a:endParaRPr lang="en-US"/>
           </a:p>
@@ -3193,7 +3127,7 @@
           <a:p>
             <a:fld id="{B35B300D-7DF5-4E96-8AA6-60E94C6E9F44}" type="datetimeFigureOut">
               <a:rPr lang="sr-Latn-RS" smtClean="0"/>
-              <a:t>13.3.2018.</a:t>
+              <a:t>20.3.2018.</a:t>
             </a:fld>
             <a:endParaRPr lang="sr-Latn-RS"/>
           </a:p>
@@ -3627,7 +3561,7 @@
           <a:p>
             <a:fld id="{B35B300D-7DF5-4E96-8AA6-60E94C6E9F44}" type="datetimeFigureOut">
               <a:rPr lang="sr-Latn-RS" smtClean="0"/>
-              <a:t>13.3.2018.</a:t>
+              <a:t>20.3.2018.</a:t>
             </a:fld>
             <a:endParaRPr lang="sr-Latn-RS"/>
           </a:p>
@@ -4001,7 +3935,7 @@
           <a:p>
             <a:fld id="{B35B300D-7DF5-4E96-8AA6-60E94C6E9F44}" type="datetimeFigureOut">
               <a:rPr lang="sr-Latn-RS" smtClean="0"/>
-              <a:t>13.3.2018.</a:t>
+              <a:t>20.3.2018.</a:t>
             </a:fld>
             <a:endParaRPr lang="sr-Latn-RS"/>
           </a:p>
@@ -4285,7 +4219,7 @@
           <a:p>
             <a:fld id="{B35B300D-7DF5-4E96-8AA6-60E94C6E9F44}" type="datetimeFigureOut">
               <a:rPr lang="sr-Latn-RS" smtClean="0"/>
-              <a:t>13.3.2018.</a:t>
+              <a:t>20.3.2018.</a:t>
             </a:fld>
             <a:endParaRPr lang="sr-Latn-RS"/>
           </a:p>
@@ -4462,7 +4396,7 @@
           <a:p>
             <a:fld id="{B35B300D-7DF5-4E96-8AA6-60E94C6E9F44}" type="datetimeFigureOut">
               <a:rPr lang="sr-Latn-RS" smtClean="0"/>
-              <a:t>13.3.2018.</a:t>
+              <a:t>20.3.2018.</a:t>
             </a:fld>
             <a:endParaRPr lang="sr-Latn-RS"/>
           </a:p>
@@ -4649,7 +4583,7 @@
           <a:p>
             <a:fld id="{B35B300D-7DF5-4E96-8AA6-60E94C6E9F44}" type="datetimeFigureOut">
               <a:rPr lang="sr-Latn-RS" smtClean="0"/>
-              <a:t>13.3.2018.</a:t>
+              <a:t>20.3.2018.</a:t>
             </a:fld>
             <a:endParaRPr lang="sr-Latn-RS"/>
           </a:p>
@@ -4896,7 +4830,7 @@
           <a:p>
             <a:fld id="{B35B300D-7DF5-4E96-8AA6-60E94C6E9F44}" type="datetimeFigureOut">
               <a:rPr lang="sr-Latn-RS" smtClean="0"/>
-              <a:t>13.3.2018.</a:t>
+              <a:t>20.3.2018.</a:t>
             </a:fld>
             <a:endParaRPr lang="sr-Latn-RS"/>
           </a:p>
@@ -5180,7 +5114,7 @@
           <a:p>
             <a:fld id="{B35B300D-7DF5-4E96-8AA6-60E94C6E9F44}" type="datetimeFigureOut">
               <a:rPr lang="sr-Latn-RS" smtClean="0"/>
-              <a:t>13.3.2018.</a:t>
+              <a:t>20.3.2018.</a:t>
             </a:fld>
             <a:endParaRPr lang="sr-Latn-RS"/>
           </a:p>
@@ -7099,7 +7033,7 @@
           <a:p>
             <a:fld id="{B35B300D-7DF5-4E96-8AA6-60E94C6E9F44}" type="datetimeFigureOut">
               <a:rPr lang="sr-Latn-RS" smtClean="0"/>
-              <a:t>13.3.2018.</a:t>
+              <a:t>20.3.2018.</a:t>
             </a:fld>
             <a:endParaRPr lang="sr-Latn-RS"/>
           </a:p>
@@ -7533,15 +7467,7 @@
             </a:br>
             <a:r>
               <a:rPr lang="en-US" b="1" smtClean="0"/>
-              <a:t>20 </a:t>
-            </a:r>
-            <a:r>
-              <a:rPr lang="en-US" b="1" smtClean="0"/>
-              <a:t>– </a:t>
-            </a:r>
-            <a:r>
-              <a:rPr lang="en-US" b="1" smtClean="0"/>
-              <a:t>26.03.2018</a:t>
+              <a:t>20 – 26.03.2018</a:t>
             </a:r>
             <a:endParaRPr lang="en-US"/>
           </a:p>
@@ -7563,10 +7489,14 @@
           <a:lstStyle/>
           <a:p>
             <a:r>
-              <a:rPr lang="en-US" smtClean="0"/>
-              <a:t>Radovan Ostojić</a:t>
-            </a:r>
-            <a:endParaRPr lang="en-US"/>
+              <a:rPr lang="en-US" dirty="0" err="1" smtClean="0"/>
+              <a:t>Sinisa</a:t>
+            </a:r>
+            <a:r>
+              <a:rPr lang="en-US" dirty="0" smtClean="0"/>
+              <a:t> Vrhovac</a:t>
+            </a:r>
+            <a:endParaRPr lang="en-US" dirty="0"/>
           </a:p>
         </p:txBody>
       </p:sp>
@@ -7590,6 +7520,743 @@
 </p:sld>
 </file>
 
+<file path=ppt/slides/slide10.xml><?xml version="1.0" encoding="utf-8"?>
+<p:sld xmlns:a="http://schemas.openxmlformats.org/drawingml/2006/main" xmlns:r="http://schemas.openxmlformats.org/officeDocument/2006/relationships" xmlns:p="http://schemas.openxmlformats.org/presentationml/2006/main" show="0">
+  <p:cSld>
+    <p:spTree>
+      <p:nvGrpSpPr>
+        <p:cNvPr id="1" name=""/>
+        <p:cNvGrpSpPr/>
+        <p:nvPr/>
+      </p:nvGrpSpPr>
+      <p:grpSpPr>
+        <a:xfrm>
+          <a:off x="0" y="0"/>
+          <a:ext cx="0" cy="0"/>
+          <a:chOff x="0" y="0"/>
+          <a:chExt cx="0" cy="0"/>
+        </a:xfrm>
+      </p:grpSpPr>
+      <p:sp>
+        <p:nvSpPr>
+          <p:cNvPr id="5" name="Title 4"/>
+          <p:cNvSpPr>
+            <a:spLocks noGrp="1"/>
+          </p:cNvSpPr>
+          <p:nvPr>
+            <p:ph type="title"/>
+          </p:nvPr>
+        </p:nvSpPr>
+        <p:spPr/>
+        <p:txBody>
+          <a:bodyPr/>
+          <a:lstStyle/>
+          <a:p>
+            <a:r>
+              <a:rPr lang="en-US" dirty="0" err="1" smtClean="0"/>
+              <a:t>Pozicija</a:t>
+            </a:r>
+            <a:r>
+              <a:rPr lang="en-US" dirty="0" smtClean="0"/>
+              <a:t> </a:t>
+            </a:r>
+            <a:r>
+              <a:rPr lang="en-US" dirty="0" err="1" smtClean="0"/>
+              <a:t>i</a:t>
+            </a:r>
+            <a:r>
+              <a:rPr lang="en-US" dirty="0" smtClean="0"/>
+              <a:t> </a:t>
+            </a:r>
+            <a:r>
+              <a:rPr lang="en-US" dirty="0" err="1" smtClean="0"/>
+              <a:t>slaganje</a:t>
+            </a:r>
+            <a:endParaRPr lang="en-US" dirty="0"/>
+          </a:p>
+        </p:txBody>
+      </p:sp>
+      <p:pic>
+        <p:nvPicPr>
+          <p:cNvPr id="2" name="Content Placeholder 1" descr="Chrome 57 porta con se alcune novità per gli sviluppatori ..."/>
+          <p:cNvPicPr>
+            <a:picLocks noGrp="1" noChangeAspect="1"/>
+          </p:cNvPicPr>
+          <p:nvPr>
+            <p:ph sz="quarter" idx="10"/>
+          </p:nvPr>
+        </p:nvPicPr>
+        <p:blipFill>
+          <a:blip r:embed="rId2">
+            <a:extLst>
+              <a:ext uri="{28A0092B-C50C-407E-A947-70E740481C1C}">
+                <a14:useLocalDpi xmlns:a14="http://schemas.microsoft.com/office/drawing/2010/main" val="0"/>
+              </a:ext>
+            </a:extLst>
+          </a:blip>
+          <a:stretch>
+            <a:fillRect/>
+          </a:stretch>
+        </p:blipFill>
+        <p:spPr>
+          <a:xfrm>
+            <a:off x="5288493" y="2600215"/>
+            <a:ext cx="6007330" cy="3871912"/>
+          </a:xfrm>
+        </p:spPr>
+      </p:pic>
+      <p:pic>
+        <p:nvPicPr>
+          <p:cNvPr id="3" name="Picture 2" descr="&lt;strong&gt;css&lt;/strong&gt; - Angular Material List &lt;strong&gt;design&lt;/strong&gt; - Stack Overflow"/>
+          <p:cNvPicPr>
+            <a:picLocks noChangeAspect="1"/>
+          </p:cNvPicPr>
+          <p:nvPr/>
+        </p:nvPicPr>
+        <p:blipFill>
+          <a:blip r:embed="rId3">
+            <a:extLst>
+              <a:ext uri="{28A0092B-C50C-407E-A947-70E740481C1C}">
+                <a14:useLocalDpi xmlns:a14="http://schemas.microsoft.com/office/drawing/2010/main" val="0"/>
+              </a:ext>
+            </a:extLst>
+          </a:blip>
+          <a:stretch>
+            <a:fillRect/>
+          </a:stretch>
+        </p:blipFill>
+        <p:spPr>
+          <a:xfrm>
+            <a:off x="8558165" y="563524"/>
+            <a:ext cx="3858491" cy="3972647"/>
+          </a:xfrm>
+          <a:prstGeom prst="rect">
+            <a:avLst/>
+          </a:prstGeom>
+        </p:spPr>
+      </p:pic>
+      <p:pic>
+        <p:nvPicPr>
+          <p:cNvPr id="4" name="Picture 3" descr="c# - Creating Custom &lt;strong&gt;Layout&lt;/strong&gt; in ASP.Net MVC3 using Razor ..."/>
+          <p:cNvPicPr>
+            <a:picLocks noChangeAspect="1"/>
+          </p:cNvPicPr>
+          <p:nvPr/>
+        </p:nvPicPr>
+        <p:blipFill>
+          <a:blip r:embed="rId4">
+            <a:extLst>
+              <a:ext uri="{28A0092B-C50C-407E-A947-70E740481C1C}">
+                <a14:useLocalDpi xmlns:a14="http://schemas.microsoft.com/office/drawing/2010/main" val="0"/>
+              </a:ext>
+            </a:extLst>
+          </a:blip>
+          <a:stretch>
+            <a:fillRect/>
+          </a:stretch>
+        </p:blipFill>
+        <p:spPr>
+          <a:xfrm>
+            <a:off x="609480" y="1418400"/>
+            <a:ext cx="7077075" cy="4333875"/>
+          </a:xfrm>
+          <a:prstGeom prst="rect">
+            <a:avLst/>
+          </a:prstGeom>
+        </p:spPr>
+      </p:pic>
+    </p:spTree>
+    <p:extLst>
+      <p:ext uri="{BB962C8B-B14F-4D97-AF65-F5344CB8AC3E}">
+        <p14:creationId xmlns:p14="http://schemas.microsoft.com/office/powerpoint/2010/main" val="1284724286"/>
+      </p:ext>
+    </p:extLst>
+  </p:cSld>
+  <p:clrMapOvr>
+    <a:masterClrMapping/>
+  </p:clrMapOvr>
+  <mc:AlternateContent xmlns:mc="http://schemas.openxmlformats.org/markup-compatibility/2006">
+    <mc:Choice xmlns:p14="http://schemas.microsoft.com/office/powerpoint/2010/main" Requires="p14">
+      <p:transition spd="slow" p14:dur="2000"/>
+    </mc:Choice>
+    <mc:Fallback>
+      <p:transition spd="slow"/>
+    </mc:Fallback>
+  </mc:AlternateContent>
+</p:sld>
+</file>
+
+<file path=ppt/slides/slide11.xml><?xml version="1.0" encoding="utf-8"?>
+<p:sld xmlns:a="http://schemas.openxmlformats.org/drawingml/2006/main" xmlns:r="http://schemas.openxmlformats.org/officeDocument/2006/relationships" xmlns:p="http://schemas.openxmlformats.org/presentationml/2006/main">
+  <p:cSld>
+    <p:spTree>
+      <p:nvGrpSpPr>
+        <p:cNvPr id="1" name=""/>
+        <p:cNvGrpSpPr/>
+        <p:nvPr/>
+      </p:nvGrpSpPr>
+      <p:grpSpPr>
+        <a:xfrm>
+          <a:off x="0" y="0"/>
+          <a:ext cx="0" cy="0"/>
+          <a:chOff x="0" y="0"/>
+          <a:chExt cx="0" cy="0"/>
+        </a:xfrm>
+      </p:grpSpPr>
+      <p:sp>
+        <p:nvSpPr>
+          <p:cNvPr id="4" name="Title 3"/>
+          <p:cNvSpPr>
+            <a:spLocks noGrp="1"/>
+          </p:cNvSpPr>
+          <p:nvPr>
+            <p:ph type="title"/>
+          </p:nvPr>
+        </p:nvSpPr>
+        <p:spPr/>
+        <p:txBody>
+          <a:bodyPr/>
+          <a:lstStyle/>
+          <a:p>
+            <a:r>
+              <a:rPr lang="en-US" dirty="0" smtClean="0"/>
+              <a:t>CSS </a:t>
+            </a:r>
+            <a:r>
+              <a:rPr lang="en-US" dirty="0" err="1" smtClean="0"/>
+              <a:t>selektori</a:t>
+            </a:r>
+            <a:endParaRPr lang="en-US" dirty="0"/>
+          </a:p>
+        </p:txBody>
+      </p:sp>
+    </p:spTree>
+    <p:extLst>
+      <p:ext uri="{BB962C8B-B14F-4D97-AF65-F5344CB8AC3E}">
+        <p14:creationId xmlns:p14="http://schemas.microsoft.com/office/powerpoint/2010/main" val="466228987"/>
+      </p:ext>
+    </p:extLst>
+  </p:cSld>
+  <p:clrMapOvr>
+    <a:masterClrMapping/>
+  </p:clrMapOvr>
+</p:sld>
+</file>
+
+<file path=ppt/slides/slide12.xml><?xml version="1.0" encoding="utf-8"?>
+<p:sld xmlns:a="http://schemas.openxmlformats.org/drawingml/2006/main" xmlns:r="http://schemas.openxmlformats.org/officeDocument/2006/relationships" xmlns:p="http://schemas.openxmlformats.org/presentationml/2006/main">
+  <p:cSld>
+    <p:spTree>
+      <p:nvGrpSpPr>
+        <p:cNvPr id="1" name=""/>
+        <p:cNvGrpSpPr/>
+        <p:nvPr/>
+      </p:nvGrpSpPr>
+      <p:grpSpPr>
+        <a:xfrm>
+          <a:off x="0" y="0"/>
+          <a:ext cx="0" cy="0"/>
+          <a:chOff x="0" y="0"/>
+          <a:chExt cx="0" cy="0"/>
+        </a:xfrm>
+      </p:grpSpPr>
+      <p:sp>
+        <p:nvSpPr>
+          <p:cNvPr id="3" name="Title 2"/>
+          <p:cNvSpPr>
+            <a:spLocks noGrp="1"/>
+          </p:cNvSpPr>
+          <p:nvPr>
+            <p:ph type="title"/>
+          </p:nvPr>
+        </p:nvSpPr>
+        <p:spPr/>
+        <p:txBody>
+          <a:bodyPr/>
+          <a:lstStyle/>
+          <a:p>
+            <a:r>
+              <a:rPr lang="en-US" dirty="0"/>
+              <a:t>CSS </a:t>
+            </a:r>
+            <a:r>
+              <a:rPr lang="en-US" dirty="0" err="1"/>
+              <a:t>selektori</a:t>
+            </a:r>
+            <a:endParaRPr lang="en-US" dirty="0"/>
+          </a:p>
+        </p:txBody>
+      </p:sp>
+      <p:sp>
+        <p:nvSpPr>
+          <p:cNvPr id="4" name="Content Placeholder 3"/>
+          <p:cNvSpPr>
+            <a:spLocks noGrp="1"/>
+          </p:cNvSpPr>
+          <p:nvPr>
+            <p:ph sz="quarter" idx="10"/>
+          </p:nvPr>
+        </p:nvSpPr>
+        <p:spPr/>
+        <p:txBody>
+          <a:bodyPr/>
+          <a:lstStyle/>
+          <a:p>
+            <a:r>
+              <a:rPr lang="en-US" dirty="0" smtClean="0"/>
+              <a:t>ID</a:t>
+            </a:r>
+          </a:p>
+          <a:p>
+            <a:r>
+              <a:rPr lang="en-US" dirty="0" smtClean="0"/>
+              <a:t>Class</a:t>
+            </a:r>
+          </a:p>
+          <a:p>
+            <a:r>
+              <a:rPr lang="en-US" dirty="0" smtClean="0"/>
+              <a:t>Element</a:t>
+            </a:r>
+          </a:p>
+          <a:p>
+            <a:r>
+              <a:rPr lang="en-US" dirty="0" err="1" smtClean="0"/>
+              <a:t>Ulancani</a:t>
+            </a:r>
+            <a:r>
+              <a:rPr lang="en-US" dirty="0" smtClean="0"/>
+              <a:t> </a:t>
+            </a:r>
+            <a:r>
+              <a:rPr lang="en-US" dirty="0" err="1" smtClean="0"/>
+              <a:t>selektori</a:t>
+            </a:r>
+            <a:endParaRPr lang="en-US" dirty="0" smtClean="0"/>
+          </a:p>
+          <a:p>
+            <a:endParaRPr lang="en-US" dirty="0" smtClean="0"/>
+          </a:p>
+        </p:txBody>
+      </p:sp>
+    </p:spTree>
+    <p:extLst>
+      <p:ext uri="{BB962C8B-B14F-4D97-AF65-F5344CB8AC3E}">
+        <p14:creationId xmlns:p14="http://schemas.microsoft.com/office/powerpoint/2010/main" val="921181862"/>
+      </p:ext>
+    </p:extLst>
+  </p:cSld>
+  <p:clrMapOvr>
+    <a:masterClrMapping/>
+  </p:clrMapOvr>
+</p:sld>
+</file>
+
+<file path=ppt/slides/slide13.xml><?xml version="1.0" encoding="utf-8"?>
+<p:sld xmlns:a="http://schemas.openxmlformats.org/drawingml/2006/main" xmlns:r="http://schemas.openxmlformats.org/officeDocument/2006/relationships" xmlns:p="http://schemas.openxmlformats.org/presentationml/2006/main">
+  <p:cSld>
+    <p:spTree>
+      <p:nvGrpSpPr>
+        <p:cNvPr id="1" name=""/>
+        <p:cNvGrpSpPr/>
+        <p:nvPr/>
+      </p:nvGrpSpPr>
+      <p:grpSpPr>
+        <a:xfrm>
+          <a:off x="0" y="0"/>
+          <a:ext cx="0" cy="0"/>
+          <a:chOff x="0" y="0"/>
+          <a:chExt cx="0" cy="0"/>
+        </a:xfrm>
+      </p:grpSpPr>
+      <p:sp>
+        <p:nvSpPr>
+          <p:cNvPr id="3" name="Title 2"/>
+          <p:cNvSpPr>
+            <a:spLocks noGrp="1"/>
+          </p:cNvSpPr>
+          <p:nvPr>
+            <p:ph type="title"/>
+          </p:nvPr>
+        </p:nvSpPr>
+        <p:spPr/>
+        <p:txBody>
+          <a:bodyPr/>
+          <a:lstStyle/>
+          <a:p>
+            <a:r>
+              <a:rPr lang="en-US" dirty="0"/>
+              <a:t>CSS </a:t>
+            </a:r>
+            <a:r>
+              <a:rPr lang="en-US" dirty="0" err="1"/>
+              <a:t>selektori</a:t>
+            </a:r>
+            <a:endParaRPr lang="en-US" dirty="0"/>
+          </a:p>
+        </p:txBody>
+      </p:sp>
+      <p:sp>
+        <p:nvSpPr>
+          <p:cNvPr id="4" name="Content Placeholder 3"/>
+          <p:cNvSpPr>
+            <a:spLocks noGrp="1"/>
+          </p:cNvSpPr>
+          <p:nvPr>
+            <p:ph sz="quarter" idx="10"/>
+          </p:nvPr>
+        </p:nvSpPr>
+        <p:spPr/>
+        <p:txBody>
+          <a:bodyPr/>
+          <a:lstStyle/>
+          <a:p>
+            <a:endParaRPr lang="en-US"/>
+          </a:p>
+        </p:txBody>
+      </p:sp>
+    </p:spTree>
+    <p:extLst>
+      <p:ext uri="{BB962C8B-B14F-4D97-AF65-F5344CB8AC3E}">
+        <p14:creationId xmlns:p14="http://schemas.microsoft.com/office/powerpoint/2010/main" val="953397289"/>
+      </p:ext>
+    </p:extLst>
+  </p:cSld>
+  <p:clrMapOvr>
+    <a:masterClrMapping/>
+  </p:clrMapOvr>
+</p:sld>
+</file>
+
+<file path=ppt/slides/slide14.xml><?xml version="1.0" encoding="utf-8"?>
+<p:sld xmlns:a="http://schemas.openxmlformats.org/drawingml/2006/main" xmlns:r="http://schemas.openxmlformats.org/officeDocument/2006/relationships" xmlns:p="http://schemas.openxmlformats.org/presentationml/2006/main">
+  <p:cSld>
+    <p:spTree>
+      <p:nvGrpSpPr>
+        <p:cNvPr id="1" name=""/>
+        <p:cNvGrpSpPr/>
+        <p:nvPr/>
+      </p:nvGrpSpPr>
+      <p:grpSpPr>
+        <a:xfrm>
+          <a:off x="0" y="0"/>
+          <a:ext cx="0" cy="0"/>
+          <a:chOff x="0" y="0"/>
+          <a:chExt cx="0" cy="0"/>
+        </a:xfrm>
+      </p:grpSpPr>
+      <p:sp>
+        <p:nvSpPr>
+          <p:cNvPr id="2" name="Title 1"/>
+          <p:cNvSpPr>
+            <a:spLocks noGrp="1"/>
+          </p:cNvSpPr>
+          <p:nvPr>
+            <p:ph type="title"/>
+          </p:nvPr>
+        </p:nvSpPr>
+        <p:spPr/>
+        <p:txBody>
+          <a:bodyPr/>
+          <a:lstStyle/>
+          <a:p>
+            <a:r>
+              <a:rPr lang="en-US" dirty="0" err="1" smtClean="0"/>
+              <a:t>Alati</a:t>
+            </a:r>
+            <a:endParaRPr lang="en-US" dirty="0"/>
+          </a:p>
+        </p:txBody>
+      </p:sp>
+    </p:spTree>
+    <p:extLst>
+      <p:ext uri="{BB962C8B-B14F-4D97-AF65-F5344CB8AC3E}">
+        <p14:creationId xmlns:p14="http://schemas.microsoft.com/office/powerpoint/2010/main" val="2078428655"/>
+      </p:ext>
+    </p:extLst>
+  </p:cSld>
+  <p:clrMapOvr>
+    <a:masterClrMapping/>
+  </p:clrMapOvr>
+</p:sld>
+</file>
+
+<file path=ppt/slides/slide15.xml><?xml version="1.0" encoding="utf-8"?>
+<p:sld xmlns:a="http://schemas.openxmlformats.org/drawingml/2006/main" xmlns:r="http://schemas.openxmlformats.org/officeDocument/2006/relationships" xmlns:p="http://schemas.openxmlformats.org/presentationml/2006/main">
+  <p:cSld>
+    <p:spTree>
+      <p:nvGrpSpPr>
+        <p:cNvPr id="1" name=""/>
+        <p:cNvGrpSpPr/>
+        <p:nvPr/>
+      </p:nvGrpSpPr>
+      <p:grpSpPr>
+        <a:xfrm>
+          <a:off x="0" y="0"/>
+          <a:ext cx="0" cy="0"/>
+          <a:chOff x="0" y="0"/>
+          <a:chExt cx="0" cy="0"/>
+        </a:xfrm>
+      </p:grpSpPr>
+      <p:sp>
+        <p:nvSpPr>
+          <p:cNvPr id="2" name="Title 1"/>
+          <p:cNvSpPr>
+            <a:spLocks noGrp="1"/>
+          </p:cNvSpPr>
+          <p:nvPr>
+            <p:ph type="title"/>
+          </p:nvPr>
+        </p:nvSpPr>
+        <p:spPr/>
+        <p:txBody>
+          <a:bodyPr/>
+          <a:lstStyle/>
+          <a:p>
+            <a:r>
+              <a:rPr lang="en-US" dirty="0" smtClean="0"/>
+              <a:t>Google Chrome</a:t>
+            </a:r>
+            <a:endParaRPr lang="en-US" dirty="0"/>
+          </a:p>
+        </p:txBody>
+      </p:sp>
+      <p:pic>
+        <p:nvPicPr>
+          <p:cNvPr id="4" name="Content Placeholder 3"/>
+          <p:cNvPicPr>
+            <a:picLocks noGrp="1" noChangeAspect="1"/>
+          </p:cNvPicPr>
+          <p:nvPr>
+            <p:ph sz="quarter" idx="10"/>
+          </p:nvPr>
+        </p:nvPicPr>
+        <p:blipFill>
+          <a:blip r:embed="rId2"/>
+          <a:stretch>
+            <a:fillRect/>
+          </a:stretch>
+        </p:blipFill>
+        <p:spPr>
+          <a:xfrm>
+            <a:off x="1841494" y="1754188"/>
+            <a:ext cx="6564324" cy="3871912"/>
+          </a:xfrm>
+          <a:prstGeom prst="rect">
+            <a:avLst/>
+          </a:prstGeom>
+        </p:spPr>
+      </p:pic>
+    </p:spTree>
+    <p:extLst>
+      <p:ext uri="{BB962C8B-B14F-4D97-AF65-F5344CB8AC3E}">
+        <p14:creationId xmlns:p14="http://schemas.microsoft.com/office/powerpoint/2010/main" val="1953357383"/>
+      </p:ext>
+    </p:extLst>
+  </p:cSld>
+  <p:clrMapOvr>
+    <a:masterClrMapping/>
+  </p:clrMapOvr>
+</p:sld>
+</file>
+
+<file path=ppt/slides/slide16.xml><?xml version="1.0" encoding="utf-8"?>
+<p:sld xmlns:a="http://schemas.openxmlformats.org/drawingml/2006/main" xmlns:r="http://schemas.openxmlformats.org/officeDocument/2006/relationships" xmlns:p="http://schemas.openxmlformats.org/presentationml/2006/main">
+  <p:cSld>
+    <p:spTree>
+      <p:nvGrpSpPr>
+        <p:cNvPr id="1" name=""/>
+        <p:cNvGrpSpPr/>
+        <p:nvPr/>
+      </p:nvGrpSpPr>
+      <p:grpSpPr>
+        <a:xfrm>
+          <a:off x="0" y="0"/>
+          <a:ext cx="0" cy="0"/>
+          <a:chOff x="0" y="0"/>
+          <a:chExt cx="0" cy="0"/>
+        </a:xfrm>
+      </p:grpSpPr>
+      <p:sp>
+        <p:nvSpPr>
+          <p:cNvPr id="2" name="Title 1"/>
+          <p:cNvSpPr>
+            <a:spLocks noGrp="1"/>
+          </p:cNvSpPr>
+          <p:nvPr>
+            <p:ph type="title"/>
+          </p:nvPr>
+        </p:nvSpPr>
+        <p:spPr/>
+        <p:txBody>
+          <a:bodyPr/>
+          <a:lstStyle/>
+          <a:p>
+            <a:r>
+              <a:rPr lang="en-US" dirty="0" err="1" smtClean="0"/>
+              <a:t>Vezbe</a:t>
+            </a:r>
+            <a:endParaRPr lang="en-US" dirty="0"/>
+          </a:p>
+        </p:txBody>
+      </p:sp>
+    </p:spTree>
+    <p:extLst>
+      <p:ext uri="{BB962C8B-B14F-4D97-AF65-F5344CB8AC3E}">
+        <p14:creationId xmlns:p14="http://schemas.microsoft.com/office/powerpoint/2010/main" val="2153955968"/>
+      </p:ext>
+    </p:extLst>
+  </p:cSld>
+  <p:clrMapOvr>
+    <a:masterClrMapping/>
+  </p:clrMapOvr>
+</p:sld>
+</file>
+
+<file path=ppt/slides/slide17.xml><?xml version="1.0" encoding="utf-8"?>
+<p:sld xmlns:a="http://schemas.openxmlformats.org/drawingml/2006/main" xmlns:r="http://schemas.openxmlformats.org/officeDocument/2006/relationships" xmlns:p="http://schemas.openxmlformats.org/presentationml/2006/main">
+  <p:cSld>
+    <p:spTree>
+      <p:nvGrpSpPr>
+        <p:cNvPr id="1" name=""/>
+        <p:cNvGrpSpPr/>
+        <p:nvPr/>
+      </p:nvGrpSpPr>
+      <p:grpSpPr>
+        <a:xfrm>
+          <a:off x="0" y="0"/>
+          <a:ext cx="0" cy="0"/>
+          <a:chOff x="0" y="0"/>
+          <a:chExt cx="0" cy="0"/>
+        </a:xfrm>
+      </p:grpSpPr>
+      <p:sp>
+        <p:nvSpPr>
+          <p:cNvPr id="2" name="Title 1"/>
+          <p:cNvSpPr>
+            <a:spLocks noGrp="1"/>
+          </p:cNvSpPr>
+          <p:nvPr>
+            <p:ph type="title"/>
+          </p:nvPr>
+        </p:nvSpPr>
+        <p:spPr/>
+        <p:txBody>
+          <a:bodyPr/>
+          <a:lstStyle/>
+          <a:p>
+            <a:r>
+              <a:rPr lang="en-US" dirty="0" err="1" smtClean="0"/>
+              <a:t>Vezbe</a:t>
+            </a:r>
+            <a:endParaRPr lang="en-US" dirty="0"/>
+          </a:p>
+        </p:txBody>
+      </p:sp>
+      <p:sp>
+        <p:nvSpPr>
+          <p:cNvPr id="3" name="Content Placeholder 2"/>
+          <p:cNvSpPr>
+            <a:spLocks noGrp="1"/>
+          </p:cNvSpPr>
+          <p:nvPr>
+            <p:ph sz="quarter" idx="10"/>
+          </p:nvPr>
+        </p:nvSpPr>
+        <p:spPr/>
+        <p:txBody>
+          <a:bodyPr/>
+          <a:lstStyle/>
+          <a:p>
+            <a:endParaRPr lang="en-US"/>
+          </a:p>
+        </p:txBody>
+      </p:sp>
+    </p:spTree>
+    <p:extLst>
+      <p:ext uri="{BB962C8B-B14F-4D97-AF65-F5344CB8AC3E}">
+        <p14:creationId xmlns:p14="http://schemas.microsoft.com/office/powerpoint/2010/main" val="2751471550"/>
+      </p:ext>
+    </p:extLst>
+  </p:cSld>
+  <p:clrMapOvr>
+    <a:masterClrMapping/>
+  </p:clrMapOvr>
+</p:sld>
+</file>
+
+<file path=ppt/slides/slide18.xml><?xml version="1.0" encoding="utf-8"?>
+<p:sld xmlns:a="http://schemas.openxmlformats.org/drawingml/2006/main" xmlns:r="http://schemas.openxmlformats.org/officeDocument/2006/relationships" xmlns:p="http://schemas.openxmlformats.org/presentationml/2006/main">
+  <p:cSld>
+    <p:spTree>
+      <p:nvGrpSpPr>
+        <p:cNvPr id="1" name=""/>
+        <p:cNvGrpSpPr/>
+        <p:nvPr/>
+      </p:nvGrpSpPr>
+      <p:grpSpPr>
+        <a:xfrm>
+          <a:off x="0" y="0"/>
+          <a:ext cx="0" cy="0"/>
+          <a:chOff x="0" y="0"/>
+          <a:chExt cx="0" cy="0"/>
+        </a:xfrm>
+      </p:grpSpPr>
+      <p:sp>
+        <p:nvSpPr>
+          <p:cNvPr id="2" name="Title 1"/>
+          <p:cNvSpPr>
+            <a:spLocks noGrp="1"/>
+          </p:cNvSpPr>
+          <p:nvPr>
+            <p:ph type="title"/>
+          </p:nvPr>
+        </p:nvSpPr>
+        <p:spPr/>
+        <p:txBody>
+          <a:bodyPr/>
+          <a:lstStyle/>
+          <a:p>
+            <a:r>
+              <a:rPr lang="en-US" dirty="0" err="1" smtClean="0"/>
+              <a:t>Vezbe</a:t>
+            </a:r>
+            <a:endParaRPr lang="en-US" dirty="0"/>
+          </a:p>
+        </p:txBody>
+      </p:sp>
+      <p:sp>
+        <p:nvSpPr>
+          <p:cNvPr id="3" name="Content Placeholder 2"/>
+          <p:cNvSpPr>
+            <a:spLocks noGrp="1"/>
+          </p:cNvSpPr>
+          <p:nvPr>
+            <p:ph sz="quarter" idx="10"/>
+          </p:nvPr>
+        </p:nvSpPr>
+        <p:spPr/>
+        <p:txBody>
+          <a:bodyPr/>
+          <a:lstStyle/>
+          <a:p>
+            <a:endParaRPr lang="en-US"/>
+          </a:p>
+        </p:txBody>
+      </p:sp>
+    </p:spTree>
+    <p:extLst>
+      <p:ext uri="{BB962C8B-B14F-4D97-AF65-F5344CB8AC3E}">
+        <p14:creationId xmlns:p14="http://schemas.microsoft.com/office/powerpoint/2010/main" val="1530457716"/>
+      </p:ext>
+    </p:extLst>
+  </p:cSld>
+  <p:clrMapOvr>
+    <a:masterClrMapping/>
+  </p:clrMapOvr>
+</p:sld>
+</file>
+
 <file path=ppt/slides/slide2.xml><?xml version="1.0" encoding="utf-8"?>
 <p:sld xmlns:a="http://schemas.openxmlformats.org/drawingml/2006/main" xmlns:r="http://schemas.openxmlformats.org/officeDocument/2006/relationships" xmlns:p="http://schemas.openxmlformats.org/presentationml/2006/main">
   <p:cSld>
@@ -7670,7 +8337,7 @@
           <p:nvPr>
             <p:extLst>
               <p:ext uri="{D42A27DB-BD31-4B8C-83A1-F6EECF244321}">
-                <p14:modId xmlns:p14="http://schemas.microsoft.com/office/powerpoint/2010/main" val="571710413"/>
+                <p14:modId xmlns:p14="http://schemas.microsoft.com/office/powerpoint/2010/main" val="2219585288"/>
               </p:ext>
             </p:extLst>
           </p:nvPr>
@@ -7774,55 +8441,6 @@
           </a:p>
         </p:txBody>
       </p:sp>
-      <p:sp>
-        <p:nvSpPr>
-          <p:cNvPr id="3" name="Content Placeholder 2"/>
-          <p:cNvSpPr>
-            <a:spLocks noGrp="1"/>
-          </p:cNvSpPr>
-          <p:nvPr>
-            <p:ph sz="half" idx="4294967295"/>
-          </p:nvPr>
-        </p:nvSpPr>
-        <p:spPr>
-          <a:xfrm>
-            <a:off x="0" y="1825625"/>
-            <a:ext cx="5570538" cy="4351338"/>
-          </a:xfrm>
-        </p:spPr>
-        <p:txBody>
-          <a:bodyPr/>
-          <a:lstStyle/>
-          <a:p>
-            <a:pPr lvl="1"/>
-            <a:endParaRPr lang="en-US" smtClean="0"/>
-          </a:p>
-        </p:txBody>
-      </p:sp>
-      <p:pic>
-        <p:nvPicPr>
-          <p:cNvPr id="9" name="Picture 8"/>
-          <p:cNvPicPr>
-            <a:picLocks noChangeAspect="1"/>
-          </p:cNvPicPr>
-          <p:nvPr/>
-        </p:nvPicPr>
-        <p:blipFill>
-          <a:blip r:embed="rId2"/>
-          <a:stretch>
-            <a:fillRect/>
-          </a:stretch>
-        </p:blipFill>
-        <p:spPr>
-          <a:xfrm>
-            <a:off x="10053638" y="4719332"/>
-            <a:ext cx="2138362" cy="2138362"/>
-          </a:xfrm>
-          <a:prstGeom prst="rect">
-            <a:avLst/>
-          </a:prstGeom>
-        </p:spPr>
-      </p:pic>
     </p:spTree>
     <p:extLst>
       <p:ext uri="{BB962C8B-B14F-4D97-AF65-F5344CB8AC3E}">
@@ -7862,12 +8480,12 @@
       </p:grpSpPr>
       <p:sp>
         <p:nvSpPr>
-          <p:cNvPr id="5" name="Text Placeholder 4"/>
+          <p:cNvPr id="2" name="Title 1"/>
           <p:cNvSpPr>
             <a:spLocks noGrp="1"/>
           </p:cNvSpPr>
           <p:nvPr>
-            <p:ph type="body" sz="quarter" idx="10"/>
+            <p:ph type="title"/>
           </p:nvPr>
         </p:nvSpPr>
         <p:spPr/>
@@ -7876,39 +8494,14 @@
           <a:lstStyle/>
           <a:p>
             <a:r>
-              <a:rPr lang="en-US" smtClean="0"/>
-              <a:t>HTML</a:t>
-            </a:r>
-            <a:endParaRPr lang="sr-Latn-RS" smtClean="0"/>
-          </a:p>
-        </p:txBody>
-      </p:sp>
-      <p:sp>
-        <p:nvSpPr>
-          <p:cNvPr id="6" name="Text Placeholder 5"/>
-          <p:cNvSpPr>
-            <a:spLocks noGrp="1"/>
-          </p:cNvSpPr>
-          <p:nvPr>
-            <p:ph type="body" sz="quarter" idx="4294967295"/>
-          </p:nvPr>
-        </p:nvSpPr>
-        <p:spPr>
-          <a:xfrm>
-            <a:off x="7368309" y="3196013"/>
-            <a:ext cx="4699000" cy="1930400"/>
-          </a:xfrm>
-        </p:spPr>
-        <p:txBody>
-          <a:bodyPr/>
-          <a:lstStyle/>
-          <a:p>
-            <a:pPr lvl="0"/>
-            <a:r>
-              <a:rPr lang="en-US" sz="4000" smtClean="0"/>
-              <a:t>text</a:t>
-            </a:r>
-            <a:endParaRPr lang="en-US" sz="4000"/>
+              <a:rPr lang="en-US" dirty="0" err="1" smtClean="0"/>
+              <a:t>Sta</a:t>
+            </a:r>
+            <a:r>
+              <a:rPr lang="en-US" dirty="0" smtClean="0"/>
+              <a:t> je CSS?</a:t>
+            </a:r>
+            <a:endParaRPr lang="en-US" dirty="0"/>
           </a:p>
         </p:txBody>
       </p:sp>
@@ -7929,6 +8522,489 @@
       </p:par>
     </p:tnLst>
   </p:timing>
+</p:sld>
+</file>
+
+<file path=ppt/slides/slide5.xml><?xml version="1.0" encoding="utf-8"?>
+<p:sld xmlns:a="http://schemas.openxmlformats.org/drawingml/2006/main" xmlns:r="http://schemas.openxmlformats.org/officeDocument/2006/relationships" xmlns:p="http://schemas.openxmlformats.org/presentationml/2006/main">
+  <p:cSld>
+    <p:spTree>
+      <p:nvGrpSpPr>
+        <p:cNvPr id="1" name=""/>
+        <p:cNvGrpSpPr/>
+        <p:nvPr/>
+      </p:nvGrpSpPr>
+      <p:grpSpPr>
+        <a:xfrm>
+          <a:off x="0" y="0"/>
+          <a:ext cx="0" cy="0"/>
+          <a:chOff x="0" y="0"/>
+          <a:chExt cx="0" cy="0"/>
+        </a:xfrm>
+      </p:grpSpPr>
+      <p:sp>
+        <p:nvSpPr>
+          <p:cNvPr id="4" name="Title 3"/>
+          <p:cNvSpPr>
+            <a:spLocks noGrp="1"/>
+          </p:cNvSpPr>
+          <p:nvPr>
+            <p:ph type="title"/>
+          </p:nvPr>
+        </p:nvSpPr>
+        <p:spPr/>
+        <p:txBody>
+          <a:bodyPr/>
+          <a:lstStyle/>
+          <a:p>
+            <a:r>
+              <a:rPr lang="en-US" dirty="0" err="1"/>
+              <a:t>Sta</a:t>
+            </a:r>
+            <a:r>
+              <a:rPr lang="en-US" dirty="0"/>
+              <a:t> je CSS?</a:t>
+            </a:r>
+          </a:p>
+        </p:txBody>
+      </p:sp>
+      <p:sp>
+        <p:nvSpPr>
+          <p:cNvPr id="5" name="Content Placeholder 4"/>
+          <p:cNvSpPr>
+            <a:spLocks noGrp="1"/>
+          </p:cNvSpPr>
+          <p:nvPr>
+            <p:ph sz="quarter" idx="10"/>
+          </p:nvPr>
+        </p:nvSpPr>
+        <p:spPr/>
+        <p:txBody>
+          <a:bodyPr/>
+          <a:lstStyle/>
+          <a:p>
+            <a:r>
+              <a:rPr lang="en-US" dirty="0" err="1" smtClean="0"/>
+              <a:t>Istorija</a:t>
+            </a:r>
+            <a:endParaRPr lang="en-US" dirty="0" smtClean="0"/>
+          </a:p>
+          <a:p>
+            <a:r>
+              <a:rPr lang="en-US" dirty="0" err="1" smtClean="0"/>
+              <a:t>Namena</a:t>
+            </a:r>
+            <a:endParaRPr lang="en-US" dirty="0" smtClean="0"/>
+          </a:p>
+          <a:p>
+            <a:r>
+              <a:rPr lang="en-US" dirty="0" err="1" smtClean="0"/>
+              <a:t>Relacija</a:t>
+            </a:r>
+            <a:r>
+              <a:rPr lang="en-US" dirty="0" smtClean="0"/>
+              <a:t> </a:t>
+            </a:r>
+            <a:r>
+              <a:rPr lang="en-US" dirty="0" err="1" smtClean="0"/>
+              <a:t>sa</a:t>
+            </a:r>
+            <a:r>
+              <a:rPr lang="en-US" dirty="0" smtClean="0"/>
+              <a:t> HTML </a:t>
+            </a:r>
+            <a:r>
+              <a:rPr lang="en-US" dirty="0" err="1" smtClean="0"/>
+              <a:t>i</a:t>
+            </a:r>
+            <a:r>
+              <a:rPr lang="en-US" dirty="0" smtClean="0"/>
+              <a:t> </a:t>
+            </a:r>
+            <a:r>
+              <a:rPr lang="en-US" dirty="0" err="1" smtClean="0"/>
+              <a:t>js</a:t>
+            </a:r>
+            <a:endParaRPr lang="en-US" dirty="0" smtClean="0"/>
+          </a:p>
+          <a:p>
+            <a:r>
+              <a:rPr lang="en-US" dirty="0" err="1" smtClean="0"/>
+              <a:t>Sintaksa</a:t>
+            </a:r>
+            <a:endParaRPr lang="en-US" dirty="0" smtClean="0"/>
+          </a:p>
+        </p:txBody>
+      </p:sp>
+    </p:spTree>
+    <p:extLst>
+      <p:ext uri="{BB962C8B-B14F-4D97-AF65-F5344CB8AC3E}">
+        <p14:creationId xmlns:p14="http://schemas.microsoft.com/office/powerpoint/2010/main" val="428666577"/>
+      </p:ext>
+    </p:extLst>
+  </p:cSld>
+  <p:clrMapOvr>
+    <a:masterClrMapping/>
+  </p:clrMapOvr>
+</p:sld>
+</file>
+
+<file path=ppt/slides/slide6.xml><?xml version="1.0" encoding="utf-8"?>
+<p:sld xmlns:a="http://schemas.openxmlformats.org/drawingml/2006/main" xmlns:r="http://schemas.openxmlformats.org/officeDocument/2006/relationships" xmlns:p="http://schemas.openxmlformats.org/presentationml/2006/main">
+  <p:cSld>
+    <p:spTree>
+      <p:nvGrpSpPr>
+        <p:cNvPr id="1" name=""/>
+        <p:cNvGrpSpPr/>
+        <p:nvPr/>
+      </p:nvGrpSpPr>
+      <p:grpSpPr>
+        <a:xfrm>
+          <a:off x="0" y="0"/>
+          <a:ext cx="0" cy="0"/>
+          <a:chOff x="0" y="0"/>
+          <a:chExt cx="0" cy="0"/>
+        </a:xfrm>
+      </p:grpSpPr>
+      <p:sp>
+        <p:nvSpPr>
+          <p:cNvPr id="2" name="Title 1"/>
+          <p:cNvSpPr>
+            <a:spLocks noGrp="1"/>
+          </p:cNvSpPr>
+          <p:nvPr>
+            <p:ph type="title"/>
+          </p:nvPr>
+        </p:nvSpPr>
+        <p:spPr/>
+        <p:txBody>
+          <a:bodyPr/>
+          <a:lstStyle/>
+          <a:p>
+            <a:r>
+              <a:rPr lang="en-US" dirty="0" smtClean="0"/>
+              <a:t>CSS Box Model</a:t>
+            </a:r>
+            <a:endParaRPr lang="en-US" dirty="0"/>
+          </a:p>
+        </p:txBody>
+      </p:sp>
+    </p:spTree>
+    <p:extLst>
+      <p:ext uri="{BB962C8B-B14F-4D97-AF65-F5344CB8AC3E}">
+        <p14:creationId xmlns:p14="http://schemas.microsoft.com/office/powerpoint/2010/main" val="424198968"/>
+      </p:ext>
+    </p:extLst>
+  </p:cSld>
+  <p:clrMapOvr>
+    <a:masterClrMapping/>
+  </p:clrMapOvr>
+</p:sld>
+</file>
+
+<file path=ppt/slides/slide7.xml><?xml version="1.0" encoding="utf-8"?>
+<p:sld xmlns:a="http://schemas.openxmlformats.org/drawingml/2006/main" xmlns:r="http://schemas.openxmlformats.org/officeDocument/2006/relationships" xmlns:p="http://schemas.openxmlformats.org/presentationml/2006/main">
+  <p:cSld>
+    <p:spTree>
+      <p:nvGrpSpPr>
+        <p:cNvPr id="1" name=""/>
+        <p:cNvGrpSpPr/>
+        <p:nvPr/>
+      </p:nvGrpSpPr>
+      <p:grpSpPr>
+        <a:xfrm>
+          <a:off x="0" y="0"/>
+          <a:ext cx="0" cy="0"/>
+          <a:chOff x="0" y="0"/>
+          <a:chExt cx="0" cy="0"/>
+        </a:xfrm>
+      </p:grpSpPr>
+      <p:sp>
+        <p:nvSpPr>
+          <p:cNvPr id="5" name="Title 4"/>
+          <p:cNvSpPr>
+            <a:spLocks noGrp="1"/>
+          </p:cNvSpPr>
+          <p:nvPr>
+            <p:ph type="title"/>
+          </p:nvPr>
+        </p:nvSpPr>
+        <p:spPr/>
+        <p:txBody>
+          <a:bodyPr/>
+          <a:lstStyle/>
+          <a:p>
+            <a:r>
+              <a:rPr lang="en-US" dirty="0"/>
+              <a:t>CSS Box Model</a:t>
+            </a:r>
+          </a:p>
+        </p:txBody>
+      </p:sp>
+      <p:pic>
+        <p:nvPicPr>
+          <p:cNvPr id="7" name="Content Placeholder 6" descr="&lt;strong&gt;css&lt;/strong&gt; - Internet Explorer &lt;strong&gt;box&lt;/strong&gt; &lt;strong&gt;model&lt;/strong&gt; - what is offset ..."/>
+          <p:cNvPicPr>
+            <a:picLocks noGrp="1" noChangeAspect="1"/>
+          </p:cNvPicPr>
+          <p:nvPr>
+            <p:ph sz="quarter" idx="10"/>
+          </p:nvPr>
+        </p:nvPicPr>
+        <p:blipFill>
+          <a:blip r:embed="rId2">
+            <a:extLst>
+              <a:ext uri="{28A0092B-C50C-407E-A947-70E740481C1C}">
+                <a14:useLocalDpi xmlns:a14="http://schemas.microsoft.com/office/drawing/2010/main" val="0"/>
+              </a:ext>
+            </a:extLst>
+          </a:blip>
+          <a:stretch>
+            <a:fillRect/>
+          </a:stretch>
+        </p:blipFill>
+        <p:spPr>
+          <a:xfrm>
+            <a:off x="3332956" y="2489994"/>
+            <a:ext cx="3581400" cy="2400300"/>
+          </a:xfrm>
+        </p:spPr>
+      </p:pic>
+    </p:spTree>
+    <p:extLst>
+      <p:ext uri="{BB962C8B-B14F-4D97-AF65-F5344CB8AC3E}">
+        <p14:creationId xmlns:p14="http://schemas.microsoft.com/office/powerpoint/2010/main" val="1100887077"/>
+      </p:ext>
+    </p:extLst>
+  </p:cSld>
+  <p:clrMapOvr>
+    <a:masterClrMapping/>
+  </p:clrMapOvr>
+</p:sld>
+</file>
+
+<file path=ppt/slides/slide8.xml><?xml version="1.0" encoding="utf-8"?>
+<p:sld xmlns:a="http://schemas.openxmlformats.org/drawingml/2006/main" xmlns:r="http://schemas.openxmlformats.org/officeDocument/2006/relationships" xmlns:p="http://schemas.openxmlformats.org/presentationml/2006/main">
+  <p:cSld>
+    <p:spTree>
+      <p:nvGrpSpPr>
+        <p:cNvPr id="1" name=""/>
+        <p:cNvGrpSpPr/>
+        <p:nvPr/>
+      </p:nvGrpSpPr>
+      <p:grpSpPr>
+        <a:xfrm>
+          <a:off x="0" y="0"/>
+          <a:ext cx="0" cy="0"/>
+          <a:chOff x="0" y="0"/>
+          <a:chExt cx="0" cy="0"/>
+        </a:xfrm>
+      </p:grpSpPr>
+      <p:sp>
+        <p:nvSpPr>
+          <p:cNvPr id="5" name="Title 4"/>
+          <p:cNvSpPr>
+            <a:spLocks noGrp="1"/>
+          </p:cNvSpPr>
+          <p:nvPr>
+            <p:ph type="title"/>
+          </p:nvPr>
+        </p:nvSpPr>
+        <p:spPr/>
+        <p:txBody>
+          <a:bodyPr/>
+          <a:lstStyle/>
+          <a:p>
+            <a:r>
+              <a:rPr lang="en-US" dirty="0" smtClean="0"/>
+              <a:t>Box </a:t>
+            </a:r>
+            <a:r>
+              <a:rPr lang="en-US" dirty="0" err="1" smtClean="0"/>
+              <a:t>i</a:t>
+            </a:r>
+            <a:r>
+              <a:rPr lang="en-US" dirty="0" smtClean="0"/>
+              <a:t> inline </a:t>
+            </a:r>
+            <a:r>
+              <a:rPr lang="en-US" dirty="0" err="1" smtClean="0"/>
+              <a:t>elementi</a:t>
+            </a:r>
+            <a:endParaRPr lang="en-US" dirty="0"/>
+          </a:p>
+        </p:txBody>
+      </p:sp>
+      <p:pic>
+        <p:nvPicPr>
+          <p:cNvPr id="2" name="Content Placeholder 1" descr="Controlling the Geometry of an HTML &lt;strong&gt;Element&lt;/strong&gt;"/>
+          <p:cNvPicPr>
+            <a:picLocks noGrp="1" noChangeAspect="1"/>
+          </p:cNvPicPr>
+          <p:nvPr>
+            <p:ph sz="quarter" idx="10"/>
+          </p:nvPr>
+        </p:nvPicPr>
+        <p:blipFill>
+          <a:blip r:embed="rId2">
+            <a:extLst>
+              <a:ext uri="{28A0092B-C50C-407E-A947-70E740481C1C}">
+                <a14:useLocalDpi xmlns:a14="http://schemas.microsoft.com/office/drawing/2010/main" val="0"/>
+              </a:ext>
+            </a:extLst>
+          </a:blip>
+          <a:stretch>
+            <a:fillRect/>
+          </a:stretch>
+        </p:blipFill>
+        <p:spPr>
+          <a:xfrm>
+            <a:off x="2075656" y="3727357"/>
+            <a:ext cx="6096000" cy="2286000"/>
+          </a:xfrm>
+        </p:spPr>
+      </p:pic>
+      <p:pic>
+        <p:nvPicPr>
+          <p:cNvPr id="3" name="Picture 2" descr="&lt;strong&gt;CSS&lt;/strong&gt; display: &lt;strong&gt;inline&lt;/strong&gt; vs &lt;strong&gt;inline&lt;/strong&gt;-block - Stack Overflow"/>
+          <p:cNvPicPr>
+            <a:picLocks noChangeAspect="1"/>
+          </p:cNvPicPr>
+          <p:nvPr/>
+        </p:nvPicPr>
+        <p:blipFill>
+          <a:blip r:embed="rId3">
+            <a:extLst>
+              <a:ext uri="{28A0092B-C50C-407E-A947-70E740481C1C}">
+                <a14:useLocalDpi xmlns:a14="http://schemas.microsoft.com/office/drawing/2010/main" val="0"/>
+              </a:ext>
+            </a:extLst>
+          </a:blip>
+          <a:stretch>
+            <a:fillRect/>
+          </a:stretch>
+        </p:blipFill>
+        <p:spPr>
+          <a:xfrm>
+            <a:off x="2075656" y="1710154"/>
+            <a:ext cx="6096000" cy="1725448"/>
+          </a:xfrm>
+          <a:prstGeom prst="rect">
+            <a:avLst/>
+          </a:prstGeom>
+        </p:spPr>
+      </p:pic>
+    </p:spTree>
+    <p:extLst>
+      <p:ext uri="{BB962C8B-B14F-4D97-AF65-F5344CB8AC3E}">
+        <p14:creationId xmlns:p14="http://schemas.microsoft.com/office/powerpoint/2010/main" val="991316607"/>
+      </p:ext>
+    </p:extLst>
+  </p:cSld>
+  <p:clrMapOvr>
+    <a:masterClrMapping/>
+  </p:clrMapOvr>
+</p:sld>
+</file>
+
+<file path=ppt/slides/slide9.xml><?xml version="1.0" encoding="utf-8"?>
+<p:sld xmlns:a="http://schemas.openxmlformats.org/drawingml/2006/main" xmlns:r="http://schemas.openxmlformats.org/officeDocument/2006/relationships" xmlns:p="http://schemas.openxmlformats.org/presentationml/2006/main">
+  <p:cSld>
+    <p:spTree>
+      <p:nvGrpSpPr>
+        <p:cNvPr id="1" name=""/>
+        <p:cNvGrpSpPr/>
+        <p:nvPr/>
+      </p:nvGrpSpPr>
+      <p:grpSpPr>
+        <a:xfrm>
+          <a:off x="0" y="0"/>
+          <a:ext cx="0" cy="0"/>
+          <a:chOff x="0" y="0"/>
+          <a:chExt cx="0" cy="0"/>
+        </a:xfrm>
+      </p:grpSpPr>
+      <p:sp>
+        <p:nvSpPr>
+          <p:cNvPr id="5" name="Title 4"/>
+          <p:cNvSpPr>
+            <a:spLocks noGrp="1"/>
+          </p:cNvSpPr>
+          <p:nvPr>
+            <p:ph type="title"/>
+          </p:nvPr>
+        </p:nvSpPr>
+        <p:spPr/>
+        <p:txBody>
+          <a:bodyPr/>
+          <a:lstStyle/>
+          <a:p>
+            <a:r>
+              <a:rPr lang="en-US" dirty="0" err="1" smtClean="0"/>
+              <a:t>Pozicija</a:t>
+            </a:r>
+            <a:r>
+              <a:rPr lang="en-US" dirty="0" smtClean="0"/>
+              <a:t> </a:t>
+            </a:r>
+            <a:r>
+              <a:rPr lang="en-US" dirty="0" err="1" smtClean="0"/>
+              <a:t>i</a:t>
+            </a:r>
+            <a:r>
+              <a:rPr lang="en-US" dirty="0" smtClean="0"/>
+              <a:t> </a:t>
+            </a:r>
+            <a:r>
+              <a:rPr lang="en-US" dirty="0" err="1" smtClean="0"/>
+              <a:t>slaganje</a:t>
+            </a:r>
+            <a:endParaRPr lang="en-US" dirty="0"/>
+          </a:p>
+        </p:txBody>
+      </p:sp>
+      <p:pic>
+        <p:nvPicPr>
+          <p:cNvPr id="8" name="Content Placeholder 7" descr="c# - Creating Custom &lt;strong&gt;Layout&lt;/strong&gt; in ASP.Net MVC3 using Razor ..."/>
+          <p:cNvPicPr>
+            <a:picLocks noGrp="1" noChangeAspect="1"/>
+          </p:cNvPicPr>
+          <p:nvPr>
+            <p:ph sz="quarter" idx="10"/>
+          </p:nvPr>
+        </p:nvPicPr>
+        <p:blipFill>
+          <a:blip r:embed="rId2">
+            <a:extLst>
+              <a:ext uri="{28A0092B-C50C-407E-A947-70E740481C1C}">
+                <a14:useLocalDpi xmlns:a14="http://schemas.microsoft.com/office/drawing/2010/main" val="0"/>
+              </a:ext>
+            </a:extLst>
+          </a:blip>
+          <a:stretch>
+            <a:fillRect/>
+          </a:stretch>
+        </p:blipFill>
+        <p:spPr>
+          <a:xfrm>
+            <a:off x="1962304" y="1754188"/>
+            <a:ext cx="6322704" cy="3871912"/>
+          </a:xfrm>
+          <a:prstGeom prst="rect">
+            <a:avLst/>
+          </a:prstGeom>
+        </p:spPr>
+      </p:pic>
+    </p:spTree>
+    <p:extLst>
+      <p:ext uri="{BB962C8B-B14F-4D97-AF65-F5344CB8AC3E}">
+        <p14:creationId xmlns:p14="http://schemas.microsoft.com/office/powerpoint/2010/main" val="2062473988"/>
+      </p:ext>
+    </p:extLst>
+  </p:cSld>
+  <p:clrMapOvr>
+    <a:masterClrMapping/>
+  </p:clrMapOvr>
 </p:sld>
 </file>
 

</xml_diff>

<commit_message>
Mala korekcije na prezentacijama.
</commit_message>
<xml_diff>
--- a/sesija-20/PPT/Front-End Developer-20.pptx
+++ b/sesija-20/PPT/Front-End Developer-20.pptx
@@ -6,7 +6,7 @@
     <p:sldMasterId id="2147483676" r:id="rId2"/>
   </p:sldMasterIdLst>
   <p:notesMasterIdLst>
-    <p:notesMasterId r:id="rId21"/>
+    <p:notesMasterId r:id="rId19"/>
   </p:notesMasterIdLst>
   <p:sldIdLst>
     <p:sldId id="256" r:id="rId3"/>
@@ -19,14 +19,12 @@
     <p:sldId id="266" r:id="rId10"/>
     <p:sldId id="267" r:id="rId11"/>
     <p:sldId id="268" r:id="rId12"/>
-    <p:sldId id="277" r:id="rId13"/>
-    <p:sldId id="269" r:id="rId14"/>
-    <p:sldId id="270" r:id="rId15"/>
-    <p:sldId id="272" r:id="rId16"/>
-    <p:sldId id="273" r:id="rId17"/>
-    <p:sldId id="276" r:id="rId18"/>
-    <p:sldId id="274" r:id="rId19"/>
-    <p:sldId id="275" r:id="rId20"/>
+    <p:sldId id="269" r:id="rId13"/>
+    <p:sldId id="270" r:id="rId14"/>
+    <p:sldId id="272" r:id="rId15"/>
+    <p:sldId id="273" r:id="rId16"/>
+    <p:sldId id="276" r:id="rId17"/>
+    <p:sldId id="275" r:id="rId18"/>
   </p:sldIdLst>
   <p:sldSz cx="12192000" cy="6858000"/>
   <p:notesSz cx="6858000" cy="9144000"/>
@@ -140,13 +138,11 @@
             <p14:sldId id="266"/>
             <p14:sldId id="267"/>
             <p14:sldId id="268"/>
-            <p14:sldId id="277"/>
             <p14:sldId id="269"/>
             <p14:sldId id="270"/>
             <p14:sldId id="272"/>
             <p14:sldId id="273"/>
             <p14:sldId id="276"/>
-            <p14:sldId id="274"/>
             <p14:sldId id="275"/>
           </p14:sldIdLst>
         </p14:section>
@@ -2381,7 +2377,7 @@
           <a:p>
             <a:fld id="{D32AC403-8EB1-4D4E-8C3A-24BD19820531}" type="datetimeFigureOut">
               <a:rPr lang="en-US" smtClean="0"/>
-              <a:t>3/26/2018</a:t>
+              <a:t>3/29/2018</a:t>
             </a:fld>
             <a:endParaRPr lang="en-US"/>
           </a:p>
@@ -3227,6 +3223,465 @@
 </p:notes>
 </file>
 
+<file path=ppt/notesSlides/notesSlide4.xml><?xml version="1.0" encoding="utf-8"?>
+<p:notes xmlns:a="http://schemas.openxmlformats.org/drawingml/2006/main" xmlns:r="http://schemas.openxmlformats.org/officeDocument/2006/relationships" xmlns:p="http://schemas.openxmlformats.org/presentationml/2006/main">
+  <p:cSld>
+    <p:spTree>
+      <p:nvGrpSpPr>
+        <p:cNvPr id="1" name=""/>
+        <p:cNvGrpSpPr/>
+        <p:nvPr/>
+      </p:nvGrpSpPr>
+      <p:grpSpPr>
+        <a:xfrm>
+          <a:off x="0" y="0"/>
+          <a:ext cx="0" cy="0"/>
+          <a:chOff x="0" y="0"/>
+          <a:chExt cx="0" cy="0"/>
+        </a:xfrm>
+      </p:grpSpPr>
+      <p:sp>
+        <p:nvSpPr>
+          <p:cNvPr id="2" name="Slide Image Placeholder 1"/>
+          <p:cNvSpPr>
+            <a:spLocks noGrp="1" noRot="1" noChangeAspect="1"/>
+          </p:cNvSpPr>
+          <p:nvPr>
+            <p:ph type="sldImg"/>
+          </p:nvPr>
+        </p:nvSpPr>
+        <p:spPr/>
+      </p:sp>
+      <p:sp>
+        <p:nvSpPr>
+          <p:cNvPr id="3" name="Notes Placeholder 2"/>
+          <p:cNvSpPr>
+            <a:spLocks noGrp="1"/>
+          </p:cNvSpPr>
+          <p:nvPr>
+            <p:ph type="body" idx="1"/>
+          </p:nvPr>
+        </p:nvSpPr>
+        <p:spPr/>
+        <p:txBody>
+          <a:bodyPr/>
+          <a:lstStyle/>
+          <a:p>
+            <a:r>
+              <a:rPr lang="en-US" dirty="0" smtClean="0"/>
+              <a:t>The CSS box model is the foundation of layout on the Web — each element is represented as a rectangular box, with the box's content, padding, border, and margin built up around one another like the layers of an onion. As a browser renders a web page layout, it works out what styles are applied to the content of each box, how big the surrounding onion layers are, and where the boxes sit in relation to one another. Before understanding how to create CSS layouts, you need to understand the box model — this is what we'll look at in this article.</a:t>
+            </a:r>
+          </a:p>
+          <a:p>
+            <a:r>
+              <a:rPr lang="en-US" sz="1200" b="0" i="0" kern="1200" dirty="0" smtClean="0">
+                <a:solidFill>
+                  <a:schemeClr val="tx1"/>
+                </a:solidFill>
+                <a:effectLst/>
+                <a:latin typeface="+mn-lt"/>
+                <a:ea typeface="+mn-ea"/>
+                <a:cs typeface="+mn-cs"/>
+              </a:rPr>
+              <a:t>Every element within a document is structured as a rectangular box inside the document layout, the size and "onion layers" of which can be tweaked using some specific CSS properties. The relevant properties are as follows:</a:t>
+            </a:r>
+          </a:p>
+          <a:p>
+            <a:endParaRPr lang="en-US" dirty="0" smtClean="0"/>
+          </a:p>
+          <a:p>
+            <a:r>
+              <a:rPr lang="en-US" b="1" dirty="0" smtClean="0"/>
+              <a:t>width and height</a:t>
+            </a:r>
+          </a:p>
+          <a:p>
+            <a:r>
+              <a:rPr lang="en-US" dirty="0" smtClean="0"/>
+              <a:t>The width and height properties set the width and height of the content box, which is the area in which the content of the box is displayed — this content includes both text content sat inside the box, and other boxes representing nested child elements.</a:t>
+            </a:r>
+          </a:p>
+          <a:p>
+            <a:endParaRPr lang="en-US" dirty="0" smtClean="0"/>
+          </a:p>
+          <a:p>
+            <a:r>
+              <a:rPr lang="en-US" b="1" dirty="0" smtClean="0"/>
+              <a:t>padding</a:t>
+            </a:r>
+          </a:p>
+          <a:p>
+            <a:r>
+              <a:rPr lang="en-US" dirty="0" smtClean="0"/>
+              <a:t>Padding refers to the inner margin of a CSS box — between the outer edge of the content box and the inner edge of the border. The size of this layer can be set on all four sides at once with the padding shorthand property, or one side at a time with the padding-top, padding-right, padding-bottom and padding-left properties.</a:t>
+            </a:r>
+          </a:p>
+          <a:p>
+            <a:endParaRPr lang="en-US" dirty="0" smtClean="0"/>
+          </a:p>
+          <a:p>
+            <a:r>
+              <a:rPr lang="en-US" b="1" dirty="0" smtClean="0"/>
+              <a:t>border</a:t>
+            </a:r>
+          </a:p>
+          <a:p>
+            <a:r>
+              <a:rPr lang="en-US" dirty="0" smtClean="0"/>
+              <a:t>The border of a CSS box sits between the outer edge of the padding and the inner edge of the margin. By default the border has a size of 0 — making it invisible — but you can set the thickness, style and color of the border to make it appear. The border shorthand property allows you to set all of these on all four sides at once, for example border: 1px solid black. This can be broken down into numerous different longhand properties for more specific styling needs:</a:t>
+            </a:r>
+          </a:p>
+          <a:p>
+            <a:r>
+              <a:rPr lang="en-US" dirty="0" smtClean="0"/>
+              <a:t>border-top, border-right, border-bottom, border-left: Set the thickness, style and color of one side of the border.</a:t>
+            </a:r>
+          </a:p>
+          <a:p>
+            <a:r>
+              <a:rPr lang="en-US" dirty="0" smtClean="0"/>
+              <a:t>border-width, border-style, border-color: Set only the thickness, style, or color individually, but for all four sides of the border.</a:t>
+            </a:r>
+          </a:p>
+          <a:p>
+            <a:r>
+              <a:rPr lang="en-US" dirty="0" smtClean="0"/>
+              <a:t>You can also set one of the three properties of a single side of the border individually, using border-top-width, border-top-style, border-top-color, etc. </a:t>
+            </a:r>
+          </a:p>
+          <a:p>
+            <a:endParaRPr lang="en-US" dirty="0" smtClean="0"/>
+          </a:p>
+          <a:p>
+            <a:r>
+              <a:rPr lang="en-US" b="1" dirty="0" smtClean="0"/>
+              <a:t>margin</a:t>
+            </a:r>
+          </a:p>
+          <a:p>
+            <a:r>
+              <a:rPr lang="en-US" dirty="0" smtClean="0"/>
+              <a:t>The margin surrounds a CSS box, and pushes up against other CSS boxes in the layout. It behaves rather like padding; the shorthand property is margin and the individual properties are margin-top, margin-right, margin-bottom, and margin-left.</a:t>
+            </a:r>
+            <a:endParaRPr lang="en-US" dirty="0"/>
+          </a:p>
+        </p:txBody>
+      </p:sp>
+      <p:sp>
+        <p:nvSpPr>
+          <p:cNvPr id="4" name="Slide Number Placeholder 3"/>
+          <p:cNvSpPr>
+            <a:spLocks noGrp="1"/>
+          </p:cNvSpPr>
+          <p:nvPr>
+            <p:ph type="sldNum" sz="quarter" idx="10"/>
+          </p:nvPr>
+        </p:nvSpPr>
+        <p:spPr/>
+        <p:txBody>
+          <a:bodyPr/>
+          <a:lstStyle/>
+          <a:p>
+            <a:fld id="{C53670EE-8D87-4DCA-A75C-57CFF257AC9C}" type="slidenum">
+              <a:rPr lang="en-US" smtClean="0"/>
+              <a:t>9</a:t>
+            </a:fld>
+            <a:endParaRPr lang="en-US"/>
+          </a:p>
+        </p:txBody>
+      </p:sp>
+    </p:spTree>
+    <p:extLst>
+      <p:ext uri="{BB962C8B-B14F-4D97-AF65-F5344CB8AC3E}">
+        <p14:creationId xmlns:p14="http://schemas.microsoft.com/office/powerpoint/2010/main" val="3204649440"/>
+      </p:ext>
+    </p:extLst>
+  </p:cSld>
+  <p:clrMapOvr>
+    <a:masterClrMapping/>
+  </p:clrMapOvr>
+</p:notes>
+</file>
+
+<file path=ppt/notesSlides/notesSlide5.xml><?xml version="1.0" encoding="utf-8"?>
+<p:notes xmlns:a="http://schemas.openxmlformats.org/drawingml/2006/main" xmlns:r="http://schemas.openxmlformats.org/officeDocument/2006/relationships" xmlns:p="http://schemas.openxmlformats.org/presentationml/2006/main">
+  <p:cSld>
+    <p:spTree>
+      <p:nvGrpSpPr>
+        <p:cNvPr id="1" name=""/>
+        <p:cNvGrpSpPr/>
+        <p:nvPr/>
+      </p:nvGrpSpPr>
+      <p:grpSpPr>
+        <a:xfrm>
+          <a:off x="0" y="0"/>
+          <a:ext cx="0" cy="0"/>
+          <a:chOff x="0" y="0"/>
+          <a:chExt cx="0" cy="0"/>
+        </a:xfrm>
+      </p:grpSpPr>
+      <p:sp>
+        <p:nvSpPr>
+          <p:cNvPr id="2" name="Slide Image Placeholder 1"/>
+          <p:cNvSpPr>
+            <a:spLocks noGrp="1" noRot="1" noChangeAspect="1"/>
+          </p:cNvSpPr>
+          <p:nvPr>
+            <p:ph type="sldImg"/>
+          </p:nvPr>
+        </p:nvSpPr>
+        <p:spPr/>
+      </p:sp>
+      <p:sp>
+        <p:nvSpPr>
+          <p:cNvPr id="3" name="Notes Placeholder 2"/>
+          <p:cNvSpPr>
+            <a:spLocks noGrp="1"/>
+          </p:cNvSpPr>
+          <p:nvPr>
+            <p:ph type="body" idx="1"/>
+          </p:nvPr>
+        </p:nvSpPr>
+        <p:spPr/>
+        <p:txBody>
+          <a:bodyPr/>
+          <a:lstStyle/>
+          <a:p>
+            <a:r>
+              <a:rPr lang="en-US" dirty="0" smtClean="0"/>
+              <a:t>In CSS, selectors are used to target the HTML elements on our web pages that we want to style. There are a wide variety of CSS selectors available, allowing for fine grained precision when selecting elements to style. In the next few articles we'll run through the different types in great detail, seeing how they work.</a:t>
+            </a:r>
+          </a:p>
+          <a:p>
+            <a:endParaRPr lang="en-US" dirty="0" smtClean="0"/>
+          </a:p>
+          <a:p>
+            <a:r>
+              <a:rPr lang="en-US" dirty="0" smtClean="0"/>
+              <a:t>Selectors can be divided into the following categories:</a:t>
+            </a:r>
+          </a:p>
+          <a:p>
+            <a:pPr marL="171450" indent="-171450">
+              <a:buFont typeface="Arial" panose="020B0604020202020204" pitchFamily="34" charset="0"/>
+              <a:buChar char="•"/>
+            </a:pPr>
+            <a:r>
+              <a:rPr lang="en-US" b="1" dirty="0" smtClean="0"/>
+              <a:t>Simple selectors</a:t>
+            </a:r>
+            <a:r>
+              <a:rPr lang="en-US" dirty="0" smtClean="0"/>
+              <a:t>: Match one or more elements based on element type, class, or id.</a:t>
+            </a:r>
+          </a:p>
+          <a:p>
+            <a:pPr marL="171450" indent="-171450">
+              <a:buFont typeface="Arial" panose="020B0604020202020204" pitchFamily="34" charset="0"/>
+              <a:buChar char="•"/>
+            </a:pPr>
+            <a:r>
+              <a:rPr lang="en-US" b="1" dirty="0" smtClean="0"/>
+              <a:t>Attribute selectors</a:t>
+            </a:r>
+            <a:r>
+              <a:rPr lang="en-US" dirty="0" smtClean="0"/>
+              <a:t>: Match one or more elements based on their attributes/attribute values.</a:t>
+            </a:r>
+          </a:p>
+          <a:p>
+            <a:pPr marL="171450" indent="-171450">
+              <a:buFont typeface="Arial" panose="020B0604020202020204" pitchFamily="34" charset="0"/>
+              <a:buChar char="•"/>
+            </a:pPr>
+            <a:r>
+              <a:rPr lang="en-US" b="1" dirty="0" smtClean="0"/>
+              <a:t>Pseudo-classes</a:t>
+            </a:r>
+            <a:r>
+              <a:rPr lang="en-US" dirty="0" smtClean="0"/>
+              <a:t>: Match one or more elements that exist in a certain state, such as an element that is being hovered over by the mouse pointer, or a checkbox that is currently disabled or checked, or an element that is the first child of its parent in the DOM tree.</a:t>
+            </a:r>
+          </a:p>
+          <a:p>
+            <a:pPr marL="171450" indent="-171450">
+              <a:buFont typeface="Arial" panose="020B0604020202020204" pitchFamily="34" charset="0"/>
+              <a:buChar char="•"/>
+            </a:pPr>
+            <a:r>
+              <a:rPr lang="en-US" b="1" dirty="0" smtClean="0"/>
+              <a:t>Pseudo-elements</a:t>
+            </a:r>
+            <a:r>
+              <a:rPr lang="en-US" dirty="0" smtClean="0"/>
+              <a:t>: Match one or more parts of content that are in a certain position in relation to an element, for example the first word of each paragraph, or generated content appearing just before an element.</a:t>
+            </a:r>
+          </a:p>
+          <a:p>
+            <a:pPr marL="171450" indent="-171450">
+              <a:buFont typeface="Arial" panose="020B0604020202020204" pitchFamily="34" charset="0"/>
+              <a:buChar char="•"/>
+            </a:pPr>
+            <a:r>
+              <a:rPr lang="en-US" b="1" dirty="0" err="1" smtClean="0"/>
+              <a:t>Combinators</a:t>
+            </a:r>
+            <a:r>
+              <a:rPr lang="en-US" dirty="0" smtClean="0"/>
+              <a:t>: These are not exactly selectors themselves, but ways of combining two or more selectors in useful ways for very specific selections. So for example, you could select only paragraphs that are direct descendants of </a:t>
+            </a:r>
+            <a:r>
+              <a:rPr lang="en-US" dirty="0" err="1" smtClean="0"/>
+              <a:t>divs</a:t>
+            </a:r>
+            <a:r>
+              <a:rPr lang="en-US" dirty="0" smtClean="0"/>
+              <a:t>, or paragraphs that come directly after headings.</a:t>
+            </a:r>
+          </a:p>
+          <a:p>
+            <a:pPr marL="171450" indent="-171450">
+              <a:buFont typeface="Arial" panose="020B0604020202020204" pitchFamily="34" charset="0"/>
+              <a:buChar char="•"/>
+            </a:pPr>
+            <a:r>
+              <a:rPr lang="en-US" b="1" dirty="0" smtClean="0"/>
+              <a:t>Multiple selectors</a:t>
+            </a:r>
+            <a:r>
+              <a:rPr lang="en-US" dirty="0" smtClean="0"/>
+              <a:t>: Again, these are not separate selectors; the idea is that you can put multiple selectors on the same CSS rule, separated by commas, to apply a single set of declarations to all the elements selected by those selectors.</a:t>
+            </a:r>
+          </a:p>
+          <a:p>
+            <a:pPr marL="0" indent="0">
+              <a:buFont typeface="Arial" panose="020B0604020202020204" pitchFamily="34" charset="0"/>
+              <a:buNone/>
+            </a:pPr>
+            <a:endParaRPr lang="en-US" dirty="0"/>
+          </a:p>
+        </p:txBody>
+      </p:sp>
+      <p:sp>
+        <p:nvSpPr>
+          <p:cNvPr id="4" name="Slide Number Placeholder 3"/>
+          <p:cNvSpPr>
+            <a:spLocks noGrp="1"/>
+          </p:cNvSpPr>
+          <p:nvPr>
+            <p:ph type="sldNum" sz="quarter" idx="10"/>
+          </p:nvPr>
+        </p:nvSpPr>
+        <p:spPr/>
+        <p:txBody>
+          <a:bodyPr/>
+          <a:lstStyle/>
+          <a:p>
+            <a:fld id="{C53670EE-8D87-4DCA-A75C-57CFF257AC9C}" type="slidenum">
+              <a:rPr lang="en-US" smtClean="0"/>
+              <a:t>12</a:t>
+            </a:fld>
+            <a:endParaRPr lang="en-US"/>
+          </a:p>
+        </p:txBody>
+      </p:sp>
+    </p:spTree>
+    <p:extLst>
+      <p:ext uri="{BB962C8B-B14F-4D97-AF65-F5344CB8AC3E}">
+        <p14:creationId xmlns:p14="http://schemas.microsoft.com/office/powerpoint/2010/main" val="1561114707"/>
+      </p:ext>
+    </p:extLst>
+  </p:cSld>
+  <p:clrMapOvr>
+    <a:masterClrMapping/>
+  </p:clrMapOvr>
+</p:notes>
+</file>
+
+<file path=ppt/notesSlides/notesSlide6.xml><?xml version="1.0" encoding="utf-8"?>
+<p:notes xmlns:a="http://schemas.openxmlformats.org/drawingml/2006/main" xmlns:r="http://schemas.openxmlformats.org/officeDocument/2006/relationships" xmlns:p="http://schemas.openxmlformats.org/presentationml/2006/main">
+  <p:cSld>
+    <p:spTree>
+      <p:nvGrpSpPr>
+        <p:cNvPr id="1" name=""/>
+        <p:cNvGrpSpPr/>
+        <p:nvPr/>
+      </p:nvGrpSpPr>
+      <p:grpSpPr>
+        <a:xfrm>
+          <a:off x="0" y="0"/>
+          <a:ext cx="0" cy="0"/>
+          <a:chOff x="0" y="0"/>
+          <a:chExt cx="0" cy="0"/>
+        </a:xfrm>
+      </p:grpSpPr>
+      <p:sp>
+        <p:nvSpPr>
+          <p:cNvPr id="2" name="Slide Image Placeholder 1"/>
+          <p:cNvSpPr>
+            <a:spLocks noGrp="1" noRot="1" noChangeAspect="1"/>
+          </p:cNvSpPr>
+          <p:nvPr>
+            <p:ph type="sldImg"/>
+          </p:nvPr>
+        </p:nvSpPr>
+        <p:spPr/>
+      </p:sp>
+      <p:sp>
+        <p:nvSpPr>
+          <p:cNvPr id="3" name="Notes Placeholder 2"/>
+          <p:cNvSpPr>
+            <a:spLocks noGrp="1"/>
+          </p:cNvSpPr>
+          <p:nvPr>
+            <p:ph type="body" idx="1"/>
+          </p:nvPr>
+        </p:nvSpPr>
+        <p:spPr/>
+        <p:txBody>
+          <a:bodyPr/>
+          <a:lstStyle/>
+          <a:p>
+            <a:endParaRPr lang="en-US" dirty="0"/>
+          </a:p>
+        </p:txBody>
+      </p:sp>
+      <p:sp>
+        <p:nvSpPr>
+          <p:cNvPr id="4" name="Slide Number Placeholder 3"/>
+          <p:cNvSpPr>
+            <a:spLocks noGrp="1"/>
+          </p:cNvSpPr>
+          <p:nvPr>
+            <p:ph type="sldNum" sz="quarter" idx="10"/>
+          </p:nvPr>
+        </p:nvSpPr>
+        <p:spPr/>
+        <p:txBody>
+          <a:bodyPr/>
+          <a:lstStyle/>
+          <a:p>
+            <a:fld id="{C53670EE-8D87-4DCA-A75C-57CFF257AC9C}" type="slidenum">
+              <a:rPr lang="en-US" smtClean="0"/>
+              <a:t>14</a:t>
+            </a:fld>
+            <a:endParaRPr lang="en-US"/>
+          </a:p>
+        </p:txBody>
+      </p:sp>
+    </p:spTree>
+    <p:extLst>
+      <p:ext uri="{BB962C8B-B14F-4D97-AF65-F5344CB8AC3E}">
+        <p14:creationId xmlns:p14="http://schemas.microsoft.com/office/powerpoint/2010/main" val="969887310"/>
+      </p:ext>
+    </p:extLst>
+  </p:cSld>
+  <p:clrMapOvr>
+    <a:masterClrMapping/>
+  </p:clrMapOvr>
+</p:notes>
+</file>
+
 <file path=ppt/slideLayouts/slideLayout1.xml><?xml version="1.0" encoding="utf-8"?>
 <p:sldLayout xmlns:a="http://schemas.openxmlformats.org/drawingml/2006/main" xmlns:r="http://schemas.openxmlformats.org/officeDocument/2006/relationships" xmlns:p="http://schemas.openxmlformats.org/presentationml/2006/main" type="title">
   <p:cSld name="Title Slide">
@@ -3705,7 +4160,7 @@
           <a:p>
             <a:fld id="{B35B300D-7DF5-4E96-8AA6-60E94C6E9F44}" type="datetimeFigureOut">
               <a:rPr lang="sr-Latn-RS" smtClean="0"/>
-              <a:t>26.3.2018.</a:t>
+              <a:t>29.3.2018.</a:t>
             </a:fld>
             <a:endParaRPr lang="sr-Latn-RS"/>
           </a:p>
@@ -4139,7 +4594,7 @@
           <a:p>
             <a:fld id="{B35B300D-7DF5-4E96-8AA6-60E94C6E9F44}" type="datetimeFigureOut">
               <a:rPr lang="sr-Latn-RS" smtClean="0"/>
-              <a:t>26.3.2018.</a:t>
+              <a:t>29.3.2018.</a:t>
             </a:fld>
             <a:endParaRPr lang="sr-Latn-RS"/>
           </a:p>
@@ -4513,7 +4968,7 @@
           <a:p>
             <a:fld id="{B35B300D-7DF5-4E96-8AA6-60E94C6E9F44}" type="datetimeFigureOut">
               <a:rPr lang="sr-Latn-RS" smtClean="0"/>
-              <a:t>26.3.2018.</a:t>
+              <a:t>29.3.2018.</a:t>
             </a:fld>
             <a:endParaRPr lang="sr-Latn-RS"/>
           </a:p>
@@ -4797,7 +5252,7 @@
           <a:p>
             <a:fld id="{B35B300D-7DF5-4E96-8AA6-60E94C6E9F44}" type="datetimeFigureOut">
               <a:rPr lang="sr-Latn-RS" smtClean="0"/>
-              <a:t>26.3.2018.</a:t>
+              <a:t>29.3.2018.</a:t>
             </a:fld>
             <a:endParaRPr lang="sr-Latn-RS"/>
           </a:p>
@@ -4974,7 +5429,7 @@
           <a:p>
             <a:fld id="{B35B300D-7DF5-4E96-8AA6-60E94C6E9F44}" type="datetimeFigureOut">
               <a:rPr lang="sr-Latn-RS" smtClean="0"/>
-              <a:t>26.3.2018.</a:t>
+              <a:t>29.3.2018.</a:t>
             </a:fld>
             <a:endParaRPr lang="sr-Latn-RS"/>
           </a:p>
@@ -5161,7 +5616,7 @@
           <a:p>
             <a:fld id="{B35B300D-7DF5-4E96-8AA6-60E94C6E9F44}" type="datetimeFigureOut">
               <a:rPr lang="sr-Latn-RS" smtClean="0"/>
-              <a:t>26.3.2018.</a:t>
+              <a:t>29.3.2018.</a:t>
             </a:fld>
             <a:endParaRPr lang="sr-Latn-RS"/>
           </a:p>
@@ -5408,7 +5863,7 @@
           <a:p>
             <a:fld id="{B35B300D-7DF5-4E96-8AA6-60E94C6E9F44}" type="datetimeFigureOut">
               <a:rPr lang="sr-Latn-RS" smtClean="0"/>
-              <a:t>26.3.2018.</a:t>
+              <a:t>29.3.2018.</a:t>
             </a:fld>
             <a:endParaRPr lang="sr-Latn-RS"/>
           </a:p>
@@ -5692,7 +6147,7 @@
           <a:p>
             <a:fld id="{B35B300D-7DF5-4E96-8AA6-60E94C6E9F44}" type="datetimeFigureOut">
               <a:rPr lang="sr-Latn-RS" smtClean="0"/>
-              <a:t>26.3.2018.</a:t>
+              <a:t>29.3.2018.</a:t>
             </a:fld>
             <a:endParaRPr lang="sr-Latn-RS"/>
           </a:p>
@@ -7611,7 +8066,7 @@
           <a:p>
             <a:fld id="{B35B300D-7DF5-4E96-8AA6-60E94C6E9F44}" type="datetimeFigureOut">
               <a:rPr lang="sr-Latn-RS" smtClean="0"/>
-              <a:t>26.3.2018.</a:t>
+              <a:t>29.3.2018.</a:t>
             </a:fld>
             <a:endParaRPr lang="sr-Latn-RS"/>
           </a:p>
@@ -8200,7 +8655,7 @@
 </file>
 
 <file path=ppt/slides/slide11.xml><?xml version="1.0" encoding="utf-8"?>
-<p:sld xmlns:a="http://schemas.openxmlformats.org/drawingml/2006/main" xmlns:r="http://schemas.openxmlformats.org/officeDocument/2006/relationships" xmlns:p="http://schemas.openxmlformats.org/presentationml/2006/main" show="0">
+<p:sld xmlns:a="http://schemas.openxmlformats.org/drawingml/2006/main" xmlns:r="http://schemas.openxmlformats.org/officeDocument/2006/relationships" xmlns:p="http://schemas.openxmlformats.org/presentationml/2006/main">
   <p:cSld>
     <p:spTree>
       <p:nvGrpSpPr>
@@ -8218,7 +8673,7 @@
       </p:grpSpPr>
       <p:sp>
         <p:nvSpPr>
-          <p:cNvPr id="5" name="Title 4"/>
+          <p:cNvPr id="4" name="Title 3"/>
           <p:cNvSpPr>
             <a:spLocks noGrp="1"/>
           </p:cNvSpPr>
@@ -8232,136 +8687,27 @@
           <a:lstStyle/>
           <a:p>
             <a:r>
+              <a:rPr lang="en-US" dirty="0" smtClean="0"/>
+              <a:t>CSS </a:t>
+            </a:r>
+            <a:r>
               <a:rPr lang="en-US" dirty="0" err="1" smtClean="0"/>
-              <a:t>Pozicija</a:t>
-            </a:r>
-            <a:r>
-              <a:rPr lang="en-US" dirty="0" smtClean="0"/>
-              <a:t> </a:t>
-            </a:r>
-            <a:r>
-              <a:rPr lang="en-US" dirty="0" err="1" smtClean="0"/>
-              <a:t>i</a:t>
-            </a:r>
-            <a:r>
-              <a:rPr lang="en-US" dirty="0" smtClean="0"/>
-              <a:t> </a:t>
-            </a:r>
-            <a:r>
-              <a:rPr lang="en-US" dirty="0" err="1" smtClean="0"/>
-              <a:t>slaganje</a:t>
+              <a:t>selektori</a:t>
             </a:r>
             <a:endParaRPr lang="en-US" dirty="0"/>
           </a:p>
         </p:txBody>
       </p:sp>
-      <p:pic>
-        <p:nvPicPr>
-          <p:cNvPr id="2" name="Content Placeholder 1" descr="Chrome 57 porta con se alcune novità per gli sviluppatori ..."/>
-          <p:cNvPicPr>
-            <a:picLocks noGrp="1" noChangeAspect="1"/>
-          </p:cNvPicPr>
-          <p:nvPr>
-            <p:ph sz="quarter" idx="10"/>
-          </p:nvPr>
-        </p:nvPicPr>
-        <p:blipFill>
-          <a:blip r:embed="rId2">
-            <a:extLst>
-              <a:ext uri="{28A0092B-C50C-407E-A947-70E740481C1C}">
-                <a14:useLocalDpi xmlns:a14="http://schemas.microsoft.com/office/drawing/2010/main" val="0"/>
-              </a:ext>
-            </a:extLst>
-          </a:blip>
-          <a:stretch>
-            <a:fillRect/>
-          </a:stretch>
-        </p:blipFill>
-        <p:spPr>
-          <a:xfrm>
-            <a:off x="5288493" y="2600215"/>
-            <a:ext cx="6007330" cy="3871912"/>
-          </a:xfrm>
-        </p:spPr>
-      </p:pic>
-      <p:pic>
-        <p:nvPicPr>
-          <p:cNvPr id="3" name="Picture 2" descr="&lt;strong&gt;css&lt;/strong&gt; - Angular Material List &lt;strong&gt;design&lt;/strong&gt; - Stack Overflow"/>
-          <p:cNvPicPr>
-            <a:picLocks noChangeAspect="1"/>
-          </p:cNvPicPr>
-          <p:nvPr/>
-        </p:nvPicPr>
-        <p:blipFill>
-          <a:blip r:embed="rId3">
-            <a:extLst>
-              <a:ext uri="{28A0092B-C50C-407E-A947-70E740481C1C}">
-                <a14:useLocalDpi xmlns:a14="http://schemas.microsoft.com/office/drawing/2010/main" val="0"/>
-              </a:ext>
-            </a:extLst>
-          </a:blip>
-          <a:stretch>
-            <a:fillRect/>
-          </a:stretch>
-        </p:blipFill>
-        <p:spPr>
-          <a:xfrm>
-            <a:off x="8558165" y="563524"/>
-            <a:ext cx="3858491" cy="3972647"/>
-          </a:xfrm>
-          <a:prstGeom prst="rect">
-            <a:avLst/>
-          </a:prstGeom>
-        </p:spPr>
-      </p:pic>
-      <p:pic>
-        <p:nvPicPr>
-          <p:cNvPr id="4" name="Picture 3" descr="c# - Creating Custom &lt;strong&gt;Layout&lt;/strong&gt; in ASP.Net MVC3 using Razor ..."/>
-          <p:cNvPicPr>
-            <a:picLocks noChangeAspect="1"/>
-          </p:cNvPicPr>
-          <p:nvPr/>
-        </p:nvPicPr>
-        <p:blipFill>
-          <a:blip r:embed="rId4">
-            <a:extLst>
-              <a:ext uri="{28A0092B-C50C-407E-A947-70E740481C1C}">
-                <a14:useLocalDpi xmlns:a14="http://schemas.microsoft.com/office/drawing/2010/main" val="0"/>
-              </a:ext>
-            </a:extLst>
-          </a:blip>
-          <a:stretch>
-            <a:fillRect/>
-          </a:stretch>
-        </p:blipFill>
-        <p:spPr>
-          <a:xfrm>
-            <a:off x="609480" y="1418400"/>
-            <a:ext cx="7077075" cy="4333875"/>
-          </a:xfrm>
-          <a:prstGeom prst="rect">
-            <a:avLst/>
-          </a:prstGeom>
-        </p:spPr>
-      </p:pic>
     </p:spTree>
     <p:extLst>
       <p:ext uri="{BB962C8B-B14F-4D97-AF65-F5344CB8AC3E}">
-        <p14:creationId xmlns:p14="http://schemas.microsoft.com/office/powerpoint/2010/main" val="1284724286"/>
+        <p14:creationId xmlns:p14="http://schemas.microsoft.com/office/powerpoint/2010/main" val="466228987"/>
       </p:ext>
     </p:extLst>
   </p:cSld>
   <p:clrMapOvr>
     <a:masterClrMapping/>
   </p:clrMapOvr>
-  <mc:AlternateContent xmlns:mc="http://schemas.openxmlformats.org/markup-compatibility/2006" xmlns:p14="http://schemas.microsoft.com/office/powerpoint/2010/main">
-    <mc:Choice Requires="p14">
-      <p:transition spd="slow" p14:dur="2000"/>
-    </mc:Choice>
-    <mc:Fallback xmlns="">
-      <p:transition spd="slow"/>
-    </mc:Fallback>
-  </mc:AlternateContent>
 </p:sld>
 </file>
 
@@ -8384,7 +8730,7 @@
       </p:grpSpPr>
       <p:sp>
         <p:nvSpPr>
-          <p:cNvPr id="4" name="Title 3"/>
+          <p:cNvPr id="3" name="Title 2"/>
           <p:cNvSpPr>
             <a:spLocks noGrp="1"/>
           </p:cNvSpPr>
@@ -8398,21 +8744,73 @@
           <a:lstStyle/>
           <a:p>
             <a:r>
+              <a:rPr lang="en-US" dirty="0"/>
+              <a:t>CSS </a:t>
+            </a:r>
+            <a:r>
+              <a:rPr lang="en-US" dirty="0" err="1"/>
+              <a:t>selektori</a:t>
+            </a:r>
+            <a:endParaRPr lang="en-US" dirty="0"/>
+          </a:p>
+        </p:txBody>
+      </p:sp>
+      <p:sp>
+        <p:nvSpPr>
+          <p:cNvPr id="4" name="Content Placeholder 3"/>
+          <p:cNvSpPr>
+            <a:spLocks noGrp="1"/>
+          </p:cNvSpPr>
+          <p:nvPr>
+            <p:ph sz="quarter" idx="10"/>
+          </p:nvPr>
+        </p:nvSpPr>
+        <p:spPr/>
+        <p:txBody>
+          <a:bodyPr/>
+          <a:lstStyle/>
+          <a:p>
+            <a:r>
               <a:rPr lang="en-US" dirty="0" smtClean="0"/>
-              <a:t>CSS </a:t>
+              <a:t>ID</a:t>
+            </a:r>
+          </a:p>
+          <a:p>
+            <a:r>
+              <a:rPr lang="en-US" dirty="0" smtClean="0"/>
+              <a:t>Class</a:t>
+            </a:r>
+          </a:p>
+          <a:p>
+            <a:r>
+              <a:rPr lang="en-US" dirty="0" smtClean="0"/>
+              <a:t>Element</a:t>
+            </a:r>
+          </a:p>
+          <a:p>
+            <a:r>
+              <a:rPr lang="en-US" dirty="0" err="1" smtClean="0"/>
+              <a:t>Ulancani</a:t>
+            </a:r>
+            <a:r>
+              <a:rPr lang="en-US" dirty="0" smtClean="0"/>
+              <a:t> </a:t>
             </a:r>
             <a:r>
               <a:rPr lang="en-US" dirty="0" err="1" smtClean="0"/>
               <a:t>selektori</a:t>
             </a:r>
-            <a:endParaRPr lang="en-US" dirty="0"/>
+            <a:endParaRPr lang="en-US" dirty="0" smtClean="0"/>
+          </a:p>
+          <a:p>
+            <a:endParaRPr lang="en-US" dirty="0" smtClean="0"/>
           </a:p>
         </p:txBody>
       </p:sp>
     </p:spTree>
     <p:extLst>
       <p:ext uri="{BB962C8B-B14F-4D97-AF65-F5344CB8AC3E}">
-        <p14:creationId xmlns:p14="http://schemas.microsoft.com/office/powerpoint/2010/main" val="466228987"/>
+        <p14:creationId xmlns:p14="http://schemas.microsoft.com/office/powerpoint/2010/main" val="921181862"/>
       </p:ext>
     </p:extLst>
   </p:cSld>
@@ -8441,7 +8839,7 @@
       </p:grpSpPr>
       <p:sp>
         <p:nvSpPr>
-          <p:cNvPr id="3" name="Title 2"/>
+          <p:cNvPr id="2" name="Title 1"/>
           <p:cNvSpPr>
             <a:spLocks noGrp="1"/>
           </p:cNvSpPr>
@@ -8455,73 +8853,17 @@
           <a:lstStyle/>
           <a:p>
             <a:r>
-              <a:rPr lang="en-US" dirty="0"/>
-              <a:t>CSS </a:t>
-            </a:r>
-            <a:r>
-              <a:rPr lang="en-US" dirty="0" err="1"/>
-              <a:t>selektori</a:t>
+              <a:rPr lang="en-US" dirty="0" err="1" smtClean="0"/>
+              <a:t>Alati</a:t>
             </a:r>
             <a:endParaRPr lang="en-US" dirty="0"/>
-          </a:p>
-        </p:txBody>
-      </p:sp>
-      <p:sp>
-        <p:nvSpPr>
-          <p:cNvPr id="4" name="Content Placeholder 3"/>
-          <p:cNvSpPr>
-            <a:spLocks noGrp="1"/>
-          </p:cNvSpPr>
-          <p:nvPr>
-            <p:ph sz="quarter" idx="10"/>
-          </p:nvPr>
-        </p:nvSpPr>
-        <p:spPr/>
-        <p:txBody>
-          <a:bodyPr/>
-          <a:lstStyle/>
-          <a:p>
-            <a:r>
-              <a:rPr lang="en-US" dirty="0" smtClean="0"/>
-              <a:t>ID</a:t>
-            </a:r>
-          </a:p>
-          <a:p>
-            <a:r>
-              <a:rPr lang="en-US" dirty="0" smtClean="0"/>
-              <a:t>Class</a:t>
-            </a:r>
-          </a:p>
-          <a:p>
-            <a:r>
-              <a:rPr lang="en-US" dirty="0" smtClean="0"/>
-              <a:t>Element</a:t>
-            </a:r>
-          </a:p>
-          <a:p>
-            <a:r>
-              <a:rPr lang="en-US" dirty="0" err="1" smtClean="0"/>
-              <a:t>Ulancani</a:t>
-            </a:r>
-            <a:r>
-              <a:rPr lang="en-US" dirty="0" smtClean="0"/>
-              <a:t> </a:t>
-            </a:r>
-            <a:r>
-              <a:rPr lang="en-US" dirty="0" err="1" smtClean="0"/>
-              <a:t>selektori</a:t>
-            </a:r>
-            <a:endParaRPr lang="en-US" dirty="0" smtClean="0"/>
-          </a:p>
-          <a:p>
-            <a:endParaRPr lang="en-US" dirty="0" smtClean="0"/>
           </a:p>
         </p:txBody>
       </p:sp>
     </p:spTree>
     <p:extLst>
       <p:ext uri="{BB962C8B-B14F-4D97-AF65-F5344CB8AC3E}">
-        <p14:creationId xmlns:p14="http://schemas.microsoft.com/office/powerpoint/2010/main" val="921181862"/>
+        <p14:creationId xmlns:p14="http://schemas.microsoft.com/office/powerpoint/2010/main" val="2078428655"/>
       </p:ext>
     </p:extLst>
   </p:cSld>
@@ -8564,59 +8906,6 @@
           <a:lstStyle/>
           <a:p>
             <a:r>
-              <a:rPr lang="en-US" dirty="0" err="1" smtClean="0"/>
-              <a:t>Alati</a:t>
-            </a:r>
-            <a:endParaRPr lang="en-US" dirty="0"/>
-          </a:p>
-        </p:txBody>
-      </p:sp>
-    </p:spTree>
-    <p:extLst>
-      <p:ext uri="{BB962C8B-B14F-4D97-AF65-F5344CB8AC3E}">
-        <p14:creationId xmlns:p14="http://schemas.microsoft.com/office/powerpoint/2010/main" val="2078428655"/>
-      </p:ext>
-    </p:extLst>
-  </p:cSld>
-  <p:clrMapOvr>
-    <a:masterClrMapping/>
-  </p:clrMapOvr>
-</p:sld>
-</file>
-
-<file path=ppt/slides/slide15.xml><?xml version="1.0" encoding="utf-8"?>
-<p:sld xmlns:a="http://schemas.openxmlformats.org/drawingml/2006/main" xmlns:r="http://schemas.openxmlformats.org/officeDocument/2006/relationships" xmlns:p="http://schemas.openxmlformats.org/presentationml/2006/main">
-  <p:cSld>
-    <p:spTree>
-      <p:nvGrpSpPr>
-        <p:cNvPr id="1" name=""/>
-        <p:cNvGrpSpPr/>
-        <p:nvPr/>
-      </p:nvGrpSpPr>
-      <p:grpSpPr>
-        <a:xfrm>
-          <a:off x="0" y="0"/>
-          <a:ext cx="0" cy="0"/>
-          <a:chOff x="0" y="0"/>
-          <a:chExt cx="0" cy="0"/>
-        </a:xfrm>
-      </p:grpSpPr>
-      <p:sp>
-        <p:nvSpPr>
-          <p:cNvPr id="2" name="Title 1"/>
-          <p:cNvSpPr>
-            <a:spLocks noGrp="1"/>
-          </p:cNvSpPr>
-          <p:nvPr>
-            <p:ph type="title"/>
-          </p:nvPr>
-        </p:nvSpPr>
-        <p:spPr/>
-        <p:txBody>
-          <a:bodyPr/>
-          <a:lstStyle/>
-          <a:p>
-            <a:r>
               <a:rPr lang="en-US" dirty="0" smtClean="0"/>
               <a:t>Google Chrome</a:t>
             </a:r>
@@ -8635,7 +8924,7 @@
           </p:nvPr>
         </p:nvPicPr>
         <p:blipFill>
-          <a:blip r:embed="rId2"/>
+          <a:blip r:embed="rId3"/>
           <a:stretch>
             <a:fillRect/>
           </a:stretch>
@@ -8663,7 +8952,7 @@
 </p:sld>
 </file>
 
-<file path=ppt/slides/slide16.xml><?xml version="1.0" encoding="utf-8"?>
+<file path=ppt/slides/slide15.xml><?xml version="1.0" encoding="utf-8"?>
 <p:sld xmlns:a="http://schemas.openxmlformats.org/drawingml/2006/main" xmlns:r="http://schemas.openxmlformats.org/officeDocument/2006/relationships" xmlns:p="http://schemas.openxmlformats.org/presentationml/2006/main">
   <p:cSld>
     <p:spTree>
@@ -8716,79 +9005,7 @@
 </p:sld>
 </file>
 
-<file path=ppt/slides/slide17.xml><?xml version="1.0" encoding="utf-8"?>
-<p:sld xmlns:a="http://schemas.openxmlformats.org/drawingml/2006/main" xmlns:r="http://schemas.openxmlformats.org/officeDocument/2006/relationships" xmlns:p="http://schemas.openxmlformats.org/presentationml/2006/main">
-  <p:cSld>
-    <p:spTree>
-      <p:nvGrpSpPr>
-        <p:cNvPr id="1" name=""/>
-        <p:cNvGrpSpPr/>
-        <p:nvPr/>
-      </p:nvGrpSpPr>
-      <p:grpSpPr>
-        <a:xfrm>
-          <a:off x="0" y="0"/>
-          <a:ext cx="0" cy="0"/>
-          <a:chOff x="0" y="0"/>
-          <a:chExt cx="0" cy="0"/>
-        </a:xfrm>
-      </p:grpSpPr>
-      <p:sp>
-        <p:nvSpPr>
-          <p:cNvPr id="2" name="Title 1"/>
-          <p:cNvSpPr>
-            <a:spLocks noGrp="1"/>
-          </p:cNvSpPr>
-          <p:nvPr>
-            <p:ph type="title"/>
-          </p:nvPr>
-        </p:nvSpPr>
-        <p:spPr/>
-        <p:txBody>
-          <a:bodyPr/>
-          <a:lstStyle/>
-          <a:p>
-            <a:r>
-              <a:rPr lang="en-US" dirty="0" err="1" smtClean="0"/>
-              <a:t>Vezbe</a:t>
-            </a:r>
-            <a:endParaRPr lang="en-US" dirty="0"/>
-          </a:p>
-        </p:txBody>
-      </p:sp>
-      <p:sp>
-        <p:nvSpPr>
-          <p:cNvPr id="3" name="Content Placeholder 2"/>
-          <p:cNvSpPr>
-            <a:spLocks noGrp="1"/>
-          </p:cNvSpPr>
-          <p:nvPr>
-            <p:ph sz="quarter" idx="10"/>
-          </p:nvPr>
-        </p:nvSpPr>
-        <p:spPr/>
-        <p:txBody>
-          <a:bodyPr/>
-          <a:lstStyle/>
-          <a:p>
-            <a:endParaRPr lang="en-US"/>
-          </a:p>
-        </p:txBody>
-      </p:sp>
-    </p:spTree>
-    <p:extLst>
-      <p:ext uri="{BB962C8B-B14F-4D97-AF65-F5344CB8AC3E}">
-        <p14:creationId xmlns:p14="http://schemas.microsoft.com/office/powerpoint/2010/main" val="2751471550"/>
-      </p:ext>
-    </p:extLst>
-  </p:cSld>
-  <p:clrMapOvr>
-    <a:masterClrMapping/>
-  </p:clrMapOvr>
-</p:sld>
-</file>
-
-<file path=ppt/slides/slide18.xml><?xml version="1.0" encoding="utf-8"?>
+<file path=ppt/slides/slide16.xml><?xml version="1.0" encoding="utf-8"?>
 <p:sld xmlns:a="http://schemas.openxmlformats.org/drawingml/2006/main" xmlns:r="http://schemas.openxmlformats.org/officeDocument/2006/relationships" xmlns:p="http://schemas.openxmlformats.org/presentationml/2006/main">
   <p:cSld>
     <p:spTree>
@@ -9554,7 +9771,7 @@
           </p:nvPr>
         </p:nvPicPr>
         <p:blipFill>
-          <a:blip r:embed="rId2">
+          <a:blip r:embed="rId3">
             <a:extLst>
               <a:ext uri="{28A0092B-C50C-407E-A947-70E740481C1C}">
                 <a14:useLocalDpi xmlns:a14="http://schemas.microsoft.com/office/drawing/2010/main" val="0"/>
@@ -9581,7 +9798,7 @@
           <p:nvPr/>
         </p:nvPicPr>
         <p:blipFill>
-          <a:blip r:embed="rId3">
+          <a:blip r:embed="rId4">
             <a:extLst>
               <a:ext uri="{28A0092B-C50C-407E-A947-70E740481C1C}">
                 <a14:useLocalDpi xmlns:a14="http://schemas.microsoft.com/office/drawing/2010/main" val="0"/>

</xml_diff>